<commit_message>
2024 update to tutorial
</commit_message>
<xml_diff>
--- a/clinically_useful_ML_prediction.pptx
+++ b/clinically_useful_ML_prediction.pptx
@@ -180,7 +180,7 @@
 <file path=ppt/revisionInfo.xml><?xml version="1.0" encoding="utf-8"?>
 <p1510:revInfo xmlns:a="http://schemas.openxmlformats.org/drawingml/2006/main" xmlns:r="http://schemas.openxmlformats.org/officeDocument/2006/relationships" xmlns:p1510="http://schemas.microsoft.com/office/powerpoint/2015/10/main">
   <p1510:revLst>
-    <p1510:client id="{5279EF03-CDA8-D342-B53D-9002005459D1}" v="148" dt="2023-03-20T16:11:31.859"/>
+    <p1510:client id="{9E839486-12B6-2047-8452-65108EC110BD}" v="13" dt="2024-01-19T01:48:59.489"/>
   </p1510:revLst>
 </p1510:revInfo>
 </file>
@@ -189,8 +189,8 @@
 <pc:chgInfo xmlns:a="http://schemas.openxmlformats.org/drawingml/2006/main" xmlns:r="http://schemas.openxmlformats.org/officeDocument/2006/relationships" xmlns:ac="http://schemas.microsoft.com/office/drawing/2013/main/command" xmlns:pc="http://schemas.microsoft.com/office/powerpoint/2013/main/command">
   <pc:docChgLst>
     <pc:chgData name="Alton Russell, Prof." userId="06708d83-fc2b-4190-b0c8-dc9a4695075b" providerId="ADAL" clId="{5279EF03-CDA8-D342-B53D-9002005459D1}"/>
-    <pc:docChg chg="undo custSel modSld">
-      <pc:chgData name="Alton Russell, Prof." userId="06708d83-fc2b-4190-b0c8-dc9a4695075b" providerId="ADAL" clId="{5279EF03-CDA8-D342-B53D-9002005459D1}" dt="2023-03-20T16:12:16.365" v="158" actId="20577"/>
+    <pc:docChg chg="undo custSel addSld delSld modSld">
+      <pc:chgData name="Alton Russell, Prof." userId="06708d83-fc2b-4190-b0c8-dc9a4695075b" providerId="ADAL" clId="{5279EF03-CDA8-D342-B53D-9002005459D1}" dt="2023-03-22T13:18:49.111" v="167" actId="1036"/>
       <pc:docMkLst>
         <pc:docMk/>
       </pc:docMkLst>
@@ -224,6 +224,324 @@
           </ac:spMkLst>
         </pc:spChg>
       </pc:sldChg>
+      <pc:sldChg chg="addSp delSp modSp modAnim">
+        <pc:chgData name="Alton Russell, Prof." userId="06708d83-fc2b-4190-b0c8-dc9a4695075b" providerId="ADAL" clId="{5279EF03-CDA8-D342-B53D-9002005459D1}" dt="2023-03-22T13:08:13.482" v="162"/>
+        <pc:sldMkLst>
+          <pc:docMk/>
+          <pc:sldMk cId="1224476269" sldId="441"/>
+        </pc:sldMkLst>
+        <pc:spChg chg="add del mod">
+          <ac:chgData name="Alton Russell, Prof." userId="06708d83-fc2b-4190-b0c8-dc9a4695075b" providerId="ADAL" clId="{5279EF03-CDA8-D342-B53D-9002005459D1}" dt="2023-03-22T13:08:13.482" v="162"/>
+          <ac:spMkLst>
+            <pc:docMk/>
+            <pc:sldMk cId="1224476269" sldId="441"/>
+            <ac:spMk id="3" creationId="{C9408F0A-C31D-9DD6-9214-1CC81E9D051D}"/>
+          </ac:spMkLst>
+        </pc:spChg>
+        <pc:spChg chg="add del mod">
+          <ac:chgData name="Alton Russell, Prof." userId="06708d83-fc2b-4190-b0c8-dc9a4695075b" providerId="ADAL" clId="{5279EF03-CDA8-D342-B53D-9002005459D1}" dt="2023-03-22T13:08:13.482" v="162"/>
+          <ac:spMkLst>
+            <pc:docMk/>
+            <pc:sldMk cId="1224476269" sldId="441"/>
+            <ac:spMk id="22" creationId="{4776AB14-F84E-99E3-B81B-17489885CE91}"/>
+          </ac:spMkLst>
+        </pc:spChg>
+        <pc:spChg chg="add del mod">
+          <ac:chgData name="Alton Russell, Prof." userId="06708d83-fc2b-4190-b0c8-dc9a4695075b" providerId="ADAL" clId="{5279EF03-CDA8-D342-B53D-9002005459D1}" dt="2023-03-22T13:08:13.482" v="162"/>
+          <ac:spMkLst>
+            <pc:docMk/>
+            <pc:sldMk cId="1224476269" sldId="441"/>
+            <ac:spMk id="23" creationId="{EA467B54-3260-B00A-D48B-A0243BFD1B2E}"/>
+          </ac:spMkLst>
+        </pc:spChg>
+        <pc:spChg chg="add del mod">
+          <ac:chgData name="Alton Russell, Prof." userId="06708d83-fc2b-4190-b0c8-dc9a4695075b" providerId="ADAL" clId="{5279EF03-CDA8-D342-B53D-9002005459D1}" dt="2023-03-22T13:08:13.482" v="162"/>
+          <ac:spMkLst>
+            <pc:docMk/>
+            <pc:sldMk cId="1224476269" sldId="441"/>
+            <ac:spMk id="24" creationId="{F90086A7-5CB3-31FA-1F99-584ADBAFD743}"/>
+          </ac:spMkLst>
+        </pc:spChg>
+        <pc:spChg chg="add del mod">
+          <ac:chgData name="Alton Russell, Prof." userId="06708d83-fc2b-4190-b0c8-dc9a4695075b" providerId="ADAL" clId="{5279EF03-CDA8-D342-B53D-9002005459D1}" dt="2023-03-22T13:08:13.482" v="162"/>
+          <ac:spMkLst>
+            <pc:docMk/>
+            <pc:sldMk cId="1224476269" sldId="441"/>
+            <ac:spMk id="25" creationId="{269934FE-FFB2-3974-26F2-1BB5FDECB9A0}"/>
+          </ac:spMkLst>
+        </pc:spChg>
+        <pc:spChg chg="add del mod">
+          <ac:chgData name="Alton Russell, Prof." userId="06708d83-fc2b-4190-b0c8-dc9a4695075b" providerId="ADAL" clId="{5279EF03-CDA8-D342-B53D-9002005459D1}" dt="2023-03-22T13:08:13.482" v="162"/>
+          <ac:spMkLst>
+            <pc:docMk/>
+            <pc:sldMk cId="1224476269" sldId="441"/>
+            <ac:spMk id="26" creationId="{4D0E64A1-70D2-B934-EA37-5FBBF334E3F5}"/>
+          </ac:spMkLst>
+        </pc:spChg>
+        <pc:spChg chg="add del mod">
+          <ac:chgData name="Alton Russell, Prof." userId="06708d83-fc2b-4190-b0c8-dc9a4695075b" providerId="ADAL" clId="{5279EF03-CDA8-D342-B53D-9002005459D1}" dt="2023-03-22T13:08:13.482" v="162"/>
+          <ac:spMkLst>
+            <pc:docMk/>
+            <pc:sldMk cId="1224476269" sldId="441"/>
+            <ac:spMk id="27" creationId="{2930FF79-EBD4-3608-F208-59F9805E4CA5}"/>
+          </ac:spMkLst>
+        </pc:spChg>
+        <pc:spChg chg="add del mod">
+          <ac:chgData name="Alton Russell, Prof." userId="06708d83-fc2b-4190-b0c8-dc9a4695075b" providerId="ADAL" clId="{5279EF03-CDA8-D342-B53D-9002005459D1}" dt="2023-03-22T13:08:13.482" v="162"/>
+          <ac:spMkLst>
+            <pc:docMk/>
+            <pc:sldMk cId="1224476269" sldId="441"/>
+            <ac:spMk id="28" creationId="{B0B9F0E0-8F0E-C658-F963-E07ED015270C}"/>
+          </ac:spMkLst>
+        </pc:spChg>
+        <pc:spChg chg="add del mod">
+          <ac:chgData name="Alton Russell, Prof." userId="06708d83-fc2b-4190-b0c8-dc9a4695075b" providerId="ADAL" clId="{5279EF03-CDA8-D342-B53D-9002005459D1}" dt="2023-03-22T13:08:13.482" v="162"/>
+          <ac:spMkLst>
+            <pc:docMk/>
+            <pc:sldMk cId="1224476269" sldId="441"/>
+            <ac:spMk id="29" creationId="{50EE9B1B-4136-EECD-9296-50D7B971EBEC}"/>
+          </ac:spMkLst>
+        </pc:spChg>
+        <pc:spChg chg="add del mod">
+          <ac:chgData name="Alton Russell, Prof." userId="06708d83-fc2b-4190-b0c8-dc9a4695075b" providerId="ADAL" clId="{5279EF03-CDA8-D342-B53D-9002005459D1}" dt="2023-03-22T13:08:13.482" v="162"/>
+          <ac:spMkLst>
+            <pc:docMk/>
+            <pc:sldMk cId="1224476269" sldId="441"/>
+            <ac:spMk id="30" creationId="{B6FE41FC-DE1F-B841-3526-61D556B4A428}"/>
+          </ac:spMkLst>
+        </pc:spChg>
+        <pc:spChg chg="add del mod">
+          <ac:chgData name="Alton Russell, Prof." userId="06708d83-fc2b-4190-b0c8-dc9a4695075b" providerId="ADAL" clId="{5279EF03-CDA8-D342-B53D-9002005459D1}" dt="2023-03-22T13:08:13.482" v="162"/>
+          <ac:spMkLst>
+            <pc:docMk/>
+            <pc:sldMk cId="1224476269" sldId="441"/>
+            <ac:spMk id="31" creationId="{F4FDF7C8-2309-3B1A-43AD-95AEAE5E2730}"/>
+          </ac:spMkLst>
+        </pc:spChg>
+        <pc:spChg chg="add del mod">
+          <ac:chgData name="Alton Russell, Prof." userId="06708d83-fc2b-4190-b0c8-dc9a4695075b" providerId="ADAL" clId="{5279EF03-CDA8-D342-B53D-9002005459D1}" dt="2023-03-22T13:08:13.482" v="162"/>
+          <ac:spMkLst>
+            <pc:docMk/>
+            <pc:sldMk cId="1224476269" sldId="441"/>
+            <ac:spMk id="32" creationId="{7AAF574F-B24F-C563-820A-8B5EE86FDB2F}"/>
+          </ac:spMkLst>
+        </pc:spChg>
+        <pc:spChg chg="add del mod">
+          <ac:chgData name="Alton Russell, Prof." userId="06708d83-fc2b-4190-b0c8-dc9a4695075b" providerId="ADAL" clId="{5279EF03-CDA8-D342-B53D-9002005459D1}" dt="2023-03-22T13:08:13.482" v="162"/>
+          <ac:spMkLst>
+            <pc:docMk/>
+            <pc:sldMk cId="1224476269" sldId="441"/>
+            <ac:spMk id="33" creationId="{66CB738A-5C0C-5E1A-D593-CE54D98FAF3E}"/>
+          </ac:spMkLst>
+        </pc:spChg>
+        <pc:spChg chg="add del mod">
+          <ac:chgData name="Alton Russell, Prof." userId="06708d83-fc2b-4190-b0c8-dc9a4695075b" providerId="ADAL" clId="{5279EF03-CDA8-D342-B53D-9002005459D1}" dt="2023-03-22T13:08:13.482" v="162"/>
+          <ac:spMkLst>
+            <pc:docMk/>
+            <pc:sldMk cId="1224476269" sldId="441"/>
+            <ac:spMk id="34" creationId="{A99B94A8-09C4-619F-2BE4-D6FB577071A6}"/>
+          </ac:spMkLst>
+        </pc:spChg>
+        <pc:spChg chg="add del mod">
+          <ac:chgData name="Alton Russell, Prof." userId="06708d83-fc2b-4190-b0c8-dc9a4695075b" providerId="ADAL" clId="{5279EF03-CDA8-D342-B53D-9002005459D1}" dt="2023-03-22T13:08:13.482" v="162"/>
+          <ac:spMkLst>
+            <pc:docMk/>
+            <pc:sldMk cId="1224476269" sldId="441"/>
+            <ac:spMk id="35" creationId="{FAC381D8-875F-E705-D41D-B007BD9AD287}"/>
+          </ac:spMkLst>
+        </pc:spChg>
+        <pc:spChg chg="add del mod">
+          <ac:chgData name="Alton Russell, Prof." userId="06708d83-fc2b-4190-b0c8-dc9a4695075b" providerId="ADAL" clId="{5279EF03-CDA8-D342-B53D-9002005459D1}" dt="2023-03-22T13:08:13.482" v="162"/>
+          <ac:spMkLst>
+            <pc:docMk/>
+            <pc:sldMk cId="1224476269" sldId="441"/>
+            <ac:spMk id="36" creationId="{7BE7957E-5641-3629-A181-BFDB7CA60775}"/>
+          </ac:spMkLst>
+        </pc:spChg>
+        <pc:spChg chg="add del mod">
+          <ac:chgData name="Alton Russell, Prof." userId="06708d83-fc2b-4190-b0c8-dc9a4695075b" providerId="ADAL" clId="{5279EF03-CDA8-D342-B53D-9002005459D1}" dt="2023-03-22T13:08:13.482" v="162"/>
+          <ac:spMkLst>
+            <pc:docMk/>
+            <pc:sldMk cId="1224476269" sldId="441"/>
+            <ac:spMk id="37" creationId="{88B70B2A-612F-A8D0-6C10-1555502A4AC1}"/>
+          </ac:spMkLst>
+        </pc:spChg>
+        <pc:spChg chg="add del mod">
+          <ac:chgData name="Alton Russell, Prof." userId="06708d83-fc2b-4190-b0c8-dc9a4695075b" providerId="ADAL" clId="{5279EF03-CDA8-D342-B53D-9002005459D1}" dt="2023-03-22T13:08:13.482" v="162"/>
+          <ac:spMkLst>
+            <pc:docMk/>
+            <pc:sldMk cId="1224476269" sldId="441"/>
+            <ac:spMk id="38" creationId="{C0F9EFEC-C244-F0F0-CEF2-948845571A22}"/>
+          </ac:spMkLst>
+        </pc:spChg>
+      </pc:sldChg>
+      <pc:sldChg chg="modSp mod">
+        <pc:chgData name="Alton Russell, Prof." userId="06708d83-fc2b-4190-b0c8-dc9a4695075b" providerId="ADAL" clId="{5279EF03-CDA8-D342-B53D-9002005459D1}" dt="2023-03-22T13:10:54.902" v="165" actId="1036"/>
+        <pc:sldMkLst>
+          <pc:docMk/>
+          <pc:sldMk cId="1718940314" sldId="443"/>
+        </pc:sldMkLst>
+        <pc:spChg chg="mod">
+          <ac:chgData name="Alton Russell, Prof." userId="06708d83-fc2b-4190-b0c8-dc9a4695075b" providerId="ADAL" clId="{5279EF03-CDA8-D342-B53D-9002005459D1}" dt="2023-03-22T13:09:06.087" v="164" actId="1076"/>
+          <ac:spMkLst>
+            <pc:docMk/>
+            <pc:sldMk cId="1718940314" sldId="443"/>
+            <ac:spMk id="2" creationId="{3C5477A3-8DFB-4598-B2C7-4E338552EE9A}"/>
+          </ac:spMkLst>
+        </pc:spChg>
+        <pc:spChg chg="mod">
+          <ac:chgData name="Alton Russell, Prof." userId="06708d83-fc2b-4190-b0c8-dc9a4695075b" providerId="ADAL" clId="{5279EF03-CDA8-D342-B53D-9002005459D1}" dt="2023-03-22T13:10:54.902" v="165" actId="1036"/>
+          <ac:spMkLst>
+            <pc:docMk/>
+            <pc:sldMk cId="1718940314" sldId="443"/>
+            <ac:spMk id="4" creationId="{E2598CBF-6EB1-4ED2-AE62-D252041E8772}"/>
+          </ac:spMkLst>
+        </pc:spChg>
+        <pc:spChg chg="mod">
+          <ac:chgData name="Alton Russell, Prof." userId="06708d83-fc2b-4190-b0c8-dc9a4695075b" providerId="ADAL" clId="{5279EF03-CDA8-D342-B53D-9002005459D1}" dt="2023-03-22T13:10:54.902" v="165" actId="1036"/>
+          <ac:spMkLst>
+            <pc:docMk/>
+            <pc:sldMk cId="1718940314" sldId="443"/>
+            <ac:spMk id="11" creationId="{2170B4EB-6CCB-4D47-A840-150E9D4A7CB0}"/>
+          </ac:spMkLst>
+        </pc:spChg>
+        <pc:spChg chg="mod">
+          <ac:chgData name="Alton Russell, Prof." userId="06708d83-fc2b-4190-b0c8-dc9a4695075b" providerId="ADAL" clId="{5279EF03-CDA8-D342-B53D-9002005459D1}" dt="2023-03-22T13:10:54.902" v="165" actId="1036"/>
+          <ac:spMkLst>
+            <pc:docMk/>
+            <pc:sldMk cId="1718940314" sldId="443"/>
+            <ac:spMk id="14" creationId="{C12A9F8E-E676-49B6-B41B-E329A208745F}"/>
+          </ac:spMkLst>
+        </pc:spChg>
+        <pc:spChg chg="mod">
+          <ac:chgData name="Alton Russell, Prof." userId="06708d83-fc2b-4190-b0c8-dc9a4695075b" providerId="ADAL" clId="{5279EF03-CDA8-D342-B53D-9002005459D1}" dt="2023-03-22T13:10:54.902" v="165" actId="1036"/>
+          <ac:spMkLst>
+            <pc:docMk/>
+            <pc:sldMk cId="1718940314" sldId="443"/>
+            <ac:spMk id="15" creationId="{AE8ACDAB-A507-439F-9F95-3951A3F1EDE9}"/>
+          </ac:spMkLst>
+        </pc:spChg>
+        <pc:spChg chg="mod">
+          <ac:chgData name="Alton Russell, Prof." userId="06708d83-fc2b-4190-b0c8-dc9a4695075b" providerId="ADAL" clId="{5279EF03-CDA8-D342-B53D-9002005459D1}" dt="2023-03-22T13:10:54.902" v="165" actId="1036"/>
+          <ac:spMkLst>
+            <pc:docMk/>
+            <pc:sldMk cId="1718940314" sldId="443"/>
+            <ac:spMk id="16" creationId="{F625E7FF-18E4-4E77-B311-8974B808DC30}"/>
+          </ac:spMkLst>
+        </pc:spChg>
+        <pc:spChg chg="mod">
+          <ac:chgData name="Alton Russell, Prof." userId="06708d83-fc2b-4190-b0c8-dc9a4695075b" providerId="ADAL" clId="{5279EF03-CDA8-D342-B53D-9002005459D1}" dt="2023-03-22T13:10:54.902" v="165" actId="1036"/>
+          <ac:spMkLst>
+            <pc:docMk/>
+            <pc:sldMk cId="1718940314" sldId="443"/>
+            <ac:spMk id="22" creationId="{4F661371-ABA5-4483-AA06-3E76B2E0F069}"/>
+          </ac:spMkLst>
+        </pc:spChg>
+        <pc:spChg chg="mod">
+          <ac:chgData name="Alton Russell, Prof." userId="06708d83-fc2b-4190-b0c8-dc9a4695075b" providerId="ADAL" clId="{5279EF03-CDA8-D342-B53D-9002005459D1}" dt="2023-03-22T13:10:54.902" v="165" actId="1036"/>
+          <ac:spMkLst>
+            <pc:docMk/>
+            <pc:sldMk cId="1718940314" sldId="443"/>
+            <ac:spMk id="23" creationId="{BA729344-344C-4C29-AC92-299F884A3A4E}"/>
+          </ac:spMkLst>
+        </pc:spChg>
+        <pc:spChg chg="mod">
+          <ac:chgData name="Alton Russell, Prof." userId="06708d83-fc2b-4190-b0c8-dc9a4695075b" providerId="ADAL" clId="{5279EF03-CDA8-D342-B53D-9002005459D1}" dt="2023-03-22T13:10:54.902" v="165" actId="1036"/>
+          <ac:spMkLst>
+            <pc:docMk/>
+            <pc:sldMk cId="1718940314" sldId="443"/>
+            <ac:spMk id="24" creationId="{B66898FA-D9E5-4BC4-8C0A-F17E8E1BE38B}"/>
+          </ac:spMkLst>
+        </pc:spChg>
+        <pc:spChg chg="mod">
+          <ac:chgData name="Alton Russell, Prof." userId="06708d83-fc2b-4190-b0c8-dc9a4695075b" providerId="ADAL" clId="{5279EF03-CDA8-D342-B53D-9002005459D1}" dt="2023-03-22T13:10:54.902" v="165" actId="1036"/>
+          <ac:spMkLst>
+            <pc:docMk/>
+            <pc:sldMk cId="1718940314" sldId="443"/>
+            <ac:spMk id="27" creationId="{1D2FE8AC-6ECF-4B66-87F5-466EFE5C5CE1}"/>
+          </ac:spMkLst>
+        </pc:spChg>
+        <pc:spChg chg="mod">
+          <ac:chgData name="Alton Russell, Prof." userId="06708d83-fc2b-4190-b0c8-dc9a4695075b" providerId="ADAL" clId="{5279EF03-CDA8-D342-B53D-9002005459D1}" dt="2023-03-22T13:10:54.902" v="165" actId="1036"/>
+          <ac:spMkLst>
+            <pc:docMk/>
+            <pc:sldMk cId="1718940314" sldId="443"/>
+            <ac:spMk id="29" creationId="{1199488E-6335-433D-B7DB-F7CA7B84B8A7}"/>
+          </ac:spMkLst>
+        </pc:spChg>
+        <pc:picChg chg="mod">
+          <ac:chgData name="Alton Russell, Prof." userId="06708d83-fc2b-4190-b0c8-dc9a4695075b" providerId="ADAL" clId="{5279EF03-CDA8-D342-B53D-9002005459D1}" dt="2023-03-22T13:10:54.902" v="165" actId="1036"/>
+          <ac:picMkLst>
+            <pc:docMk/>
+            <pc:sldMk cId="1718940314" sldId="443"/>
+            <ac:picMk id="33" creationId="{6E2F5CB6-93FA-4B18-87BB-7029057E54A1}"/>
+          </ac:picMkLst>
+        </pc:picChg>
+        <pc:picChg chg="mod">
+          <ac:chgData name="Alton Russell, Prof." userId="06708d83-fc2b-4190-b0c8-dc9a4695075b" providerId="ADAL" clId="{5279EF03-CDA8-D342-B53D-9002005459D1}" dt="2023-03-22T13:10:54.902" v="165" actId="1036"/>
+          <ac:picMkLst>
+            <pc:docMk/>
+            <pc:sldMk cId="1718940314" sldId="443"/>
+            <ac:picMk id="36" creationId="{382EF769-D697-4A30-A0F6-30FD30774A57}"/>
+          </ac:picMkLst>
+        </pc:picChg>
+        <pc:picChg chg="mod">
+          <ac:chgData name="Alton Russell, Prof." userId="06708d83-fc2b-4190-b0c8-dc9a4695075b" providerId="ADAL" clId="{5279EF03-CDA8-D342-B53D-9002005459D1}" dt="2023-03-22T13:10:54.902" v="165" actId="1036"/>
+          <ac:picMkLst>
+            <pc:docMk/>
+            <pc:sldMk cId="1718940314" sldId="443"/>
+            <ac:picMk id="1030" creationId="{A15D61D9-3BDA-41D3-AFE2-3DB9F51D2A62}"/>
+          </ac:picMkLst>
+        </pc:picChg>
+        <pc:picChg chg="mod">
+          <ac:chgData name="Alton Russell, Prof." userId="06708d83-fc2b-4190-b0c8-dc9a4695075b" providerId="ADAL" clId="{5279EF03-CDA8-D342-B53D-9002005459D1}" dt="2023-03-22T13:10:54.902" v="165" actId="1036"/>
+          <ac:picMkLst>
+            <pc:docMk/>
+            <pc:sldMk cId="1718940314" sldId="443"/>
+            <ac:picMk id="1032" creationId="{6CC2F96A-C141-4815-AAAE-50E36D5D6D51}"/>
+          </ac:picMkLst>
+        </pc:picChg>
+        <pc:cxnChg chg="mod">
+          <ac:chgData name="Alton Russell, Prof." userId="06708d83-fc2b-4190-b0c8-dc9a4695075b" providerId="ADAL" clId="{5279EF03-CDA8-D342-B53D-9002005459D1}" dt="2023-03-22T13:10:54.902" v="165" actId="1036"/>
+          <ac:cxnSpMkLst>
+            <pc:docMk/>
+            <pc:sldMk cId="1718940314" sldId="443"/>
+            <ac:cxnSpMk id="20" creationId="{DFC70D22-B79F-47E3-B52A-3E5743961DF9}"/>
+          </ac:cxnSpMkLst>
+        </pc:cxnChg>
+        <pc:cxnChg chg="mod">
+          <ac:chgData name="Alton Russell, Prof." userId="06708d83-fc2b-4190-b0c8-dc9a4695075b" providerId="ADAL" clId="{5279EF03-CDA8-D342-B53D-9002005459D1}" dt="2023-03-22T13:10:54.902" v="165" actId="1036"/>
+          <ac:cxnSpMkLst>
+            <pc:docMk/>
+            <pc:sldMk cId="1718940314" sldId="443"/>
+            <ac:cxnSpMk id="28" creationId="{4EAC9C11-472A-4121-84E6-32700DD71E78}"/>
+          </ac:cxnSpMkLst>
+        </pc:cxnChg>
+        <pc:cxnChg chg="mod">
+          <ac:chgData name="Alton Russell, Prof." userId="06708d83-fc2b-4190-b0c8-dc9a4695075b" providerId="ADAL" clId="{5279EF03-CDA8-D342-B53D-9002005459D1}" dt="2023-03-22T13:10:54.902" v="165" actId="1036"/>
+          <ac:cxnSpMkLst>
+            <pc:docMk/>
+            <pc:sldMk cId="1718940314" sldId="443"/>
+            <ac:cxnSpMk id="30" creationId="{19D545F9-9088-42E2-A449-1B20AD53ED41}"/>
+          </ac:cxnSpMkLst>
+        </pc:cxnChg>
+        <pc:cxnChg chg="mod">
+          <ac:chgData name="Alton Russell, Prof." userId="06708d83-fc2b-4190-b0c8-dc9a4695075b" providerId="ADAL" clId="{5279EF03-CDA8-D342-B53D-9002005459D1}" dt="2023-03-22T13:10:54.902" v="165" actId="1036"/>
+          <ac:cxnSpMkLst>
+            <pc:docMk/>
+            <pc:sldMk cId="1718940314" sldId="443"/>
+            <ac:cxnSpMk id="32" creationId="{C1543EE5-9818-4D99-9B89-CBCCFE600414}"/>
+          </ac:cxnSpMkLst>
+        </pc:cxnChg>
+        <pc:cxnChg chg="mod">
+          <ac:chgData name="Alton Russell, Prof." userId="06708d83-fc2b-4190-b0c8-dc9a4695075b" providerId="ADAL" clId="{5279EF03-CDA8-D342-B53D-9002005459D1}" dt="2023-03-22T13:10:54.902" v="165" actId="1036"/>
+          <ac:cxnSpMkLst>
+            <pc:docMk/>
+            <pc:sldMk cId="1718940314" sldId="443"/>
+            <ac:cxnSpMk id="35" creationId="{CA7982E0-AFE3-44EB-A4F4-C85E21AF74F1}"/>
+          </ac:cxnSpMkLst>
+        </pc:cxnChg>
+      </pc:sldChg>
       <pc:sldChg chg="modAnim">
         <pc:chgData name="Alton Russell, Prof." userId="06708d83-fc2b-4190-b0c8-dc9a4695075b" providerId="ADAL" clId="{5279EF03-CDA8-D342-B53D-9002005459D1}" dt="2023-03-20T16:05:49.642" v="0"/>
         <pc:sldMkLst>
@@ -231,8 +549,142 @@
           <pc:sldMk cId="2907761813" sldId="444"/>
         </pc:sldMkLst>
       </pc:sldChg>
-      <pc:sldChg chg="addSp delSp modSp mod delAnim modAnim">
-        <pc:chgData name="Alton Russell, Prof." userId="06708d83-fc2b-4190-b0c8-dc9a4695075b" providerId="ADAL" clId="{5279EF03-CDA8-D342-B53D-9002005459D1}" dt="2023-03-20T16:11:31.859" v="133"/>
+      <pc:sldChg chg="modSp mod">
+        <pc:chgData name="Alton Russell, Prof." userId="06708d83-fc2b-4190-b0c8-dc9a4695075b" providerId="ADAL" clId="{5279EF03-CDA8-D342-B53D-9002005459D1}" dt="2023-03-22T13:14:29.958" v="166" actId="1036"/>
+        <pc:sldMkLst>
+          <pc:docMk/>
+          <pc:sldMk cId="3062542047" sldId="447"/>
+        </pc:sldMkLst>
+        <pc:spChg chg="mod">
+          <ac:chgData name="Alton Russell, Prof." userId="06708d83-fc2b-4190-b0c8-dc9a4695075b" providerId="ADAL" clId="{5279EF03-CDA8-D342-B53D-9002005459D1}" dt="2023-03-22T13:14:29.958" v="166" actId="1036"/>
+          <ac:spMkLst>
+            <pc:docMk/>
+            <pc:sldMk cId="3062542047" sldId="447"/>
+            <ac:spMk id="4" creationId="{2916DA41-A2EB-410B-B9EF-214246C1F471}"/>
+          </ac:spMkLst>
+        </pc:spChg>
+        <pc:spChg chg="mod">
+          <ac:chgData name="Alton Russell, Prof." userId="06708d83-fc2b-4190-b0c8-dc9a4695075b" providerId="ADAL" clId="{5279EF03-CDA8-D342-B53D-9002005459D1}" dt="2023-03-22T13:14:29.958" v="166" actId="1036"/>
+          <ac:spMkLst>
+            <pc:docMk/>
+            <pc:sldMk cId="3062542047" sldId="447"/>
+            <ac:spMk id="5" creationId="{886AE0F5-A1FF-4CD0-9735-07460BE0C30B}"/>
+          </ac:spMkLst>
+        </pc:spChg>
+        <pc:spChg chg="mod">
+          <ac:chgData name="Alton Russell, Prof." userId="06708d83-fc2b-4190-b0c8-dc9a4695075b" providerId="ADAL" clId="{5279EF03-CDA8-D342-B53D-9002005459D1}" dt="2023-03-22T13:14:29.958" v="166" actId="1036"/>
+          <ac:spMkLst>
+            <pc:docMk/>
+            <pc:sldMk cId="3062542047" sldId="447"/>
+            <ac:spMk id="6" creationId="{ECBF3B62-2519-4B03-A79C-8B1149901C2A}"/>
+          </ac:spMkLst>
+        </pc:spChg>
+        <pc:spChg chg="mod">
+          <ac:chgData name="Alton Russell, Prof." userId="06708d83-fc2b-4190-b0c8-dc9a4695075b" providerId="ADAL" clId="{5279EF03-CDA8-D342-B53D-9002005459D1}" dt="2023-03-22T13:14:29.958" v="166" actId="1036"/>
+          <ac:spMkLst>
+            <pc:docMk/>
+            <pc:sldMk cId="3062542047" sldId="447"/>
+            <ac:spMk id="7" creationId="{41C14BB5-8EE8-4232-972F-E865EE91C7B9}"/>
+          </ac:spMkLst>
+        </pc:spChg>
+        <pc:spChg chg="mod">
+          <ac:chgData name="Alton Russell, Prof." userId="06708d83-fc2b-4190-b0c8-dc9a4695075b" providerId="ADAL" clId="{5279EF03-CDA8-D342-B53D-9002005459D1}" dt="2023-03-22T13:14:29.958" v="166" actId="1036"/>
+          <ac:spMkLst>
+            <pc:docMk/>
+            <pc:sldMk cId="3062542047" sldId="447"/>
+            <ac:spMk id="9" creationId="{A1AF4145-2AA7-466E-B38D-BBC3F479E1E3}"/>
+          </ac:spMkLst>
+        </pc:spChg>
+        <pc:spChg chg="mod">
+          <ac:chgData name="Alton Russell, Prof." userId="06708d83-fc2b-4190-b0c8-dc9a4695075b" providerId="ADAL" clId="{5279EF03-CDA8-D342-B53D-9002005459D1}" dt="2023-03-22T13:14:29.958" v="166" actId="1036"/>
+          <ac:spMkLst>
+            <pc:docMk/>
+            <pc:sldMk cId="3062542047" sldId="447"/>
+            <ac:spMk id="11" creationId="{8BF17649-72AA-48DA-B437-5A6AC3DF2446}"/>
+          </ac:spMkLst>
+        </pc:spChg>
+        <pc:spChg chg="mod">
+          <ac:chgData name="Alton Russell, Prof." userId="06708d83-fc2b-4190-b0c8-dc9a4695075b" providerId="ADAL" clId="{5279EF03-CDA8-D342-B53D-9002005459D1}" dt="2023-03-22T13:14:29.958" v="166" actId="1036"/>
+          <ac:spMkLst>
+            <pc:docMk/>
+            <pc:sldMk cId="3062542047" sldId="447"/>
+            <ac:spMk id="14" creationId="{483B6F3A-B2D6-4CD3-9280-11E948BEFCCA}"/>
+          </ac:spMkLst>
+        </pc:spChg>
+        <pc:spChg chg="mod">
+          <ac:chgData name="Alton Russell, Prof." userId="06708d83-fc2b-4190-b0c8-dc9a4695075b" providerId="ADAL" clId="{5279EF03-CDA8-D342-B53D-9002005459D1}" dt="2023-03-22T13:14:29.958" v="166" actId="1036"/>
+          <ac:spMkLst>
+            <pc:docMk/>
+            <pc:sldMk cId="3062542047" sldId="447"/>
+            <ac:spMk id="15" creationId="{0CFBFF64-F5F4-4B1E-8728-7C0575F0DD6B}"/>
+          </ac:spMkLst>
+        </pc:spChg>
+        <pc:spChg chg="mod">
+          <ac:chgData name="Alton Russell, Prof." userId="06708d83-fc2b-4190-b0c8-dc9a4695075b" providerId="ADAL" clId="{5279EF03-CDA8-D342-B53D-9002005459D1}" dt="2023-03-22T13:14:29.958" v="166" actId="1036"/>
+          <ac:spMkLst>
+            <pc:docMk/>
+            <pc:sldMk cId="3062542047" sldId="447"/>
+            <ac:spMk id="16" creationId="{E72423B9-A44A-4C0F-AEFF-C6D2C042B0F6}"/>
+          </ac:spMkLst>
+        </pc:spChg>
+        <pc:spChg chg="mod">
+          <ac:chgData name="Alton Russell, Prof." userId="06708d83-fc2b-4190-b0c8-dc9a4695075b" providerId="ADAL" clId="{5279EF03-CDA8-D342-B53D-9002005459D1}" dt="2023-03-22T13:14:29.958" v="166" actId="1036"/>
+          <ac:spMkLst>
+            <pc:docMk/>
+            <pc:sldMk cId="3062542047" sldId="447"/>
+            <ac:spMk id="17" creationId="{431166C9-9885-4EEB-8837-82ADA68B8F80}"/>
+          </ac:spMkLst>
+        </pc:spChg>
+        <pc:spChg chg="mod">
+          <ac:chgData name="Alton Russell, Prof." userId="06708d83-fc2b-4190-b0c8-dc9a4695075b" providerId="ADAL" clId="{5279EF03-CDA8-D342-B53D-9002005459D1}" dt="2023-03-22T13:14:29.958" v="166" actId="1036"/>
+          <ac:spMkLst>
+            <pc:docMk/>
+            <pc:sldMk cId="3062542047" sldId="447"/>
+            <ac:spMk id="18" creationId="{337DE5C1-3856-464A-81A4-608B6A0AF875}"/>
+          </ac:spMkLst>
+        </pc:spChg>
+      </pc:sldChg>
+      <pc:sldChg chg="modSp mod">
+        <pc:chgData name="Alton Russell, Prof." userId="06708d83-fc2b-4190-b0c8-dc9a4695075b" providerId="ADAL" clId="{5279EF03-CDA8-D342-B53D-9002005459D1}" dt="2023-03-22T13:18:49.111" v="167" actId="1036"/>
+        <pc:sldMkLst>
+          <pc:docMk/>
+          <pc:sldMk cId="72476753" sldId="465"/>
+        </pc:sldMkLst>
+        <pc:spChg chg="mod">
+          <ac:chgData name="Alton Russell, Prof." userId="06708d83-fc2b-4190-b0c8-dc9a4695075b" providerId="ADAL" clId="{5279EF03-CDA8-D342-B53D-9002005459D1}" dt="2023-03-22T13:18:49.111" v="167" actId="1036"/>
+          <ac:spMkLst>
+            <pc:docMk/>
+            <pc:sldMk cId="72476753" sldId="465"/>
+            <ac:spMk id="6" creationId="{D5FB1872-1C51-40E4-8344-7198089BEF31}"/>
+          </ac:spMkLst>
+        </pc:spChg>
+        <pc:cxnChg chg="mod">
+          <ac:chgData name="Alton Russell, Prof." userId="06708d83-fc2b-4190-b0c8-dc9a4695075b" providerId="ADAL" clId="{5279EF03-CDA8-D342-B53D-9002005459D1}" dt="2023-03-22T13:18:49.111" v="167" actId="1036"/>
+          <ac:cxnSpMkLst>
+            <pc:docMk/>
+            <pc:sldMk cId="72476753" sldId="465"/>
+            <ac:cxnSpMk id="8" creationId="{03D5E892-E782-4FEC-9712-036648816180}"/>
+          </ac:cxnSpMkLst>
+        </pc:cxnChg>
+        <pc:cxnChg chg="mod">
+          <ac:chgData name="Alton Russell, Prof." userId="06708d83-fc2b-4190-b0c8-dc9a4695075b" providerId="ADAL" clId="{5279EF03-CDA8-D342-B53D-9002005459D1}" dt="2023-03-22T13:18:49.111" v="167" actId="1036"/>
+          <ac:cxnSpMkLst>
+            <pc:docMk/>
+            <pc:sldMk cId="72476753" sldId="465"/>
+            <ac:cxnSpMk id="10" creationId="{A46BB896-BFBC-4314-B340-A3876535A0F7}"/>
+          </ac:cxnSpMkLst>
+        </pc:cxnChg>
+        <pc:cxnChg chg="mod">
+          <ac:chgData name="Alton Russell, Prof." userId="06708d83-fc2b-4190-b0c8-dc9a4695075b" providerId="ADAL" clId="{5279EF03-CDA8-D342-B53D-9002005459D1}" dt="2023-03-22T13:18:49.111" v="167" actId="1036"/>
+          <ac:cxnSpMkLst>
+            <pc:docMk/>
+            <pc:sldMk cId="72476753" sldId="465"/>
+            <ac:cxnSpMk id="12" creationId="{9854EFCA-F418-40ED-99BF-B164E607B7C6}"/>
+          </ac:cxnSpMkLst>
+        </pc:cxnChg>
+      </pc:sldChg>
+      <pc:sldChg chg="addSp delSp modSp add del mod delAnim modAnim">
+        <pc:chgData name="Alton Russell, Prof." userId="06708d83-fc2b-4190-b0c8-dc9a4695075b" providerId="ADAL" clId="{5279EF03-CDA8-D342-B53D-9002005459D1}" dt="2023-03-22T13:06:20.959" v="160" actId="2696"/>
         <pc:sldMkLst>
           <pc:docMk/>
           <pc:sldMk cId="1244900993" sldId="466"/>
@@ -295,6 +747,54 @@
       </pc:sldChg>
     </pc:docChg>
   </pc:docChgLst>
+  <pc:docChgLst>
+    <pc:chgData name="Alton Russell, Prof." userId="06708d83-fc2b-4190-b0c8-dc9a4695075b" providerId="ADAL" clId="{9E839486-12B6-2047-8452-65108EC110BD}"/>
+    <pc:docChg chg="modSld">
+      <pc:chgData name="Alton Russell, Prof." userId="06708d83-fc2b-4190-b0c8-dc9a4695075b" providerId="ADAL" clId="{9E839486-12B6-2047-8452-65108EC110BD}" dt="2024-01-19T01:48:59.489" v="14" actId="20577"/>
+      <pc:docMkLst>
+        <pc:docMk/>
+      </pc:docMkLst>
+      <pc:sldChg chg="modSp mod">
+        <pc:chgData name="Alton Russell, Prof." userId="06708d83-fc2b-4190-b0c8-dc9a4695075b" providerId="ADAL" clId="{9E839486-12B6-2047-8452-65108EC110BD}" dt="2024-01-19T01:48:59.489" v="14" actId="20577"/>
+        <pc:sldMkLst>
+          <pc:docMk/>
+          <pc:sldMk cId="1224476269" sldId="441"/>
+        </pc:sldMkLst>
+        <pc:spChg chg="mod">
+          <ac:chgData name="Alton Russell, Prof." userId="06708d83-fc2b-4190-b0c8-dc9a4695075b" providerId="ADAL" clId="{9E839486-12B6-2047-8452-65108EC110BD}" dt="2024-01-19T01:47:35.267" v="6" actId="14100"/>
+          <ac:spMkLst>
+            <pc:docMk/>
+            <pc:sldMk cId="1224476269" sldId="441"/>
+            <ac:spMk id="6" creationId="{4259FEA2-AE10-40A2-A4F5-FB6E23ECCB64}"/>
+          </ac:spMkLst>
+        </pc:spChg>
+        <pc:spChg chg="mod">
+          <ac:chgData name="Alton Russell, Prof." userId="06708d83-fc2b-4190-b0c8-dc9a4695075b" providerId="ADAL" clId="{9E839486-12B6-2047-8452-65108EC110BD}" dt="2024-01-19T01:47:32.736" v="5" actId="14100"/>
+          <ac:spMkLst>
+            <pc:docMk/>
+            <pc:sldMk cId="1224476269" sldId="441"/>
+            <ac:spMk id="9" creationId="{1EEF9CCE-22BF-4B4A-A52B-135C2EFD1188}"/>
+          </ac:spMkLst>
+        </pc:spChg>
+        <pc:spChg chg="mod">
+          <ac:chgData name="Alton Russell, Prof." userId="06708d83-fc2b-4190-b0c8-dc9a4695075b" providerId="ADAL" clId="{9E839486-12B6-2047-8452-65108EC110BD}" dt="2024-01-19T01:48:59.489" v="14" actId="20577"/>
+          <ac:spMkLst>
+            <pc:docMk/>
+            <pc:sldMk cId="1224476269" sldId="441"/>
+            <ac:spMk id="13" creationId="{F419F929-A7E0-4098-8F9E-98A89EB23408}"/>
+          </ac:spMkLst>
+        </pc:spChg>
+        <pc:spChg chg="mod">
+          <ac:chgData name="Alton Russell, Prof." userId="06708d83-fc2b-4190-b0c8-dc9a4695075b" providerId="ADAL" clId="{9E839486-12B6-2047-8452-65108EC110BD}" dt="2024-01-19T01:48:46.110" v="13" actId="208"/>
+          <ac:spMkLst>
+            <pc:docMk/>
+            <pc:sldMk cId="1224476269" sldId="441"/>
+            <ac:spMk id="15" creationId="{049C2215-7951-4155-888D-FBECDC34B043}"/>
+          </ac:spMkLst>
+        </pc:spChg>
+      </pc:sldChg>
+    </pc:docChg>
+  </pc:docChgLst>
 </pc:chgInfo>
 </file>
 
@@ -380,7 +880,7 @@
           <a:p>
             <a:fld id="{CFEE1859-4263-C04F-8FAF-D610645E05EF}" type="datetimeFigureOut">
               <a:rPr lang="en-US" smtClean="0"/>
-              <a:t>3/20/23</a:t>
+              <a:t>1/18/24</a:t>
             </a:fld>
             <a:endParaRPr lang="en-US"/>
           </a:p>
@@ -545,7 +1045,7 @@
           <a:p>
             <a:fld id="{F531145C-1842-F84B-830F-EAD798CE3624}" type="datetimeFigureOut">
               <a:rPr lang="en-US" smtClean="0"/>
-              <a:t>3/20/23</a:t>
+              <a:t>1/18/24</a:t>
             </a:fld>
             <a:endParaRPr lang="en-US"/>
           </a:p>
@@ -10110,7 +10610,7 @@
         </p:nvSpPr>
         <p:spPr>
           <a:xfrm>
-            <a:off x="9829686" y="3448165"/>
+            <a:off x="9829686" y="3459740"/>
             <a:ext cx="1712498" cy="650700"/>
           </a:xfrm>
           <a:prstGeom prst="rect">
@@ -10158,7 +10658,7 @@
         </p:nvSpPr>
         <p:spPr>
           <a:xfrm>
-            <a:off x="1274238" y="3343473"/>
+            <a:off x="1274238" y="3355048"/>
             <a:ext cx="8564652" cy="905241"/>
           </a:xfrm>
           <a:prstGeom prst="rightArrow">
@@ -10211,7 +10711,7 @@
         </p:nvSpPr>
         <p:spPr>
           <a:xfrm flipV="1">
-            <a:off x="1255832" y="4054297"/>
+            <a:off x="1255832" y="4065872"/>
             <a:ext cx="8027806" cy="1360369"/>
           </a:xfrm>
           <a:prstGeom prst="rtTriangle">
@@ -10260,7 +10760,7 @@
         </p:nvSpPr>
         <p:spPr>
           <a:xfrm rot="10800000" flipV="1">
-            <a:off x="1265035" y="2181557"/>
+            <a:off x="1265035" y="2193132"/>
             <a:ext cx="8027806" cy="1360369"/>
           </a:xfrm>
           <a:prstGeom prst="rtTriangle">
@@ -10312,7 +10812,7 @@
         </p:nvSpPr>
         <p:spPr>
           <a:xfrm>
-            <a:off x="1378627" y="4212321"/>
+            <a:off x="1378627" y="4223896"/>
             <a:ext cx="3629378" cy="369332"/>
           </a:xfrm>
           <a:prstGeom prst="rect">
@@ -10351,7 +10851,7 @@
         </p:nvSpPr>
         <p:spPr>
           <a:xfrm rot="10800000">
-            <a:off x="1682044" y="2619021"/>
+            <a:off x="1682044" y="2630596"/>
             <a:ext cx="451556" cy="1004395"/>
           </a:xfrm>
           <a:prstGeom prst="upArrow">
@@ -10396,7 +10896,7 @@
         </p:nvSpPr>
         <p:spPr>
           <a:xfrm>
-            <a:off x="1378627" y="1569916"/>
+            <a:off x="1378627" y="1581491"/>
             <a:ext cx="2674084" cy="923330"/>
           </a:xfrm>
           <a:prstGeom prst="rect">
@@ -10438,7 +10938,7 @@
         </p:nvSpPr>
         <p:spPr>
           <a:xfrm>
-            <a:off x="8004476" y="3994187"/>
+            <a:off x="8004476" y="4005762"/>
             <a:ext cx="451556" cy="1004395"/>
           </a:xfrm>
           <a:prstGeom prst="upArrow">
@@ -10483,7 +10983,7 @@
         </p:nvSpPr>
         <p:spPr>
           <a:xfrm>
-            <a:off x="7503038" y="5113937"/>
+            <a:off x="7503038" y="5125512"/>
             <a:ext cx="3433130" cy="923330"/>
           </a:xfrm>
           <a:prstGeom prst="rect">
@@ -10525,7 +11025,7 @@
         </p:nvSpPr>
         <p:spPr>
           <a:xfrm>
-            <a:off x="3702757" y="5271911"/>
+            <a:off x="3702757" y="5283486"/>
             <a:ext cx="3245030" cy="1077218"/>
           </a:xfrm>
           <a:prstGeom prst="rect">
@@ -10581,7 +11081,7 @@
         </p:nvSpPr>
         <p:spPr>
           <a:xfrm>
-            <a:off x="5099494" y="4153568"/>
+            <a:off x="5099494" y="4165143"/>
             <a:ext cx="451556" cy="1004395"/>
           </a:xfrm>
           <a:prstGeom prst="upArrow">
@@ -16031,7 +16531,7 @@
         </p:nvSpPr>
         <p:spPr>
           <a:xfrm>
-            <a:off x="7627433" y="2118417"/>
+            <a:off x="7627433" y="2129992"/>
             <a:ext cx="2765503" cy="2031325"/>
           </a:xfrm>
           <a:prstGeom prst="rect">
@@ -16090,7 +16590,7 @@
         </p:nvCxnSpPr>
         <p:spPr>
           <a:xfrm>
-            <a:off x="5887843" y="1248024"/>
+            <a:off x="5887843" y="1259599"/>
             <a:ext cx="1594624" cy="2012795"/>
           </a:xfrm>
           <a:prstGeom prst="line">
@@ -16131,7 +16631,7 @@
         </p:nvCxnSpPr>
         <p:spPr>
           <a:xfrm flipV="1">
-            <a:off x="7203687" y="2653078"/>
+            <a:off x="7203687" y="2664653"/>
             <a:ext cx="278780" cy="238358"/>
           </a:xfrm>
           <a:prstGeom prst="straightConnector1">
@@ -16173,7 +16673,7 @@
         </p:nvCxnSpPr>
         <p:spPr>
           <a:xfrm flipV="1">
-            <a:off x="6073697" y="1248024"/>
+            <a:off x="6073697" y="1259599"/>
             <a:ext cx="278780" cy="238358"/>
           </a:xfrm>
           <a:prstGeom prst="straightConnector1">
@@ -25910,8 +26410,8 @@
         </p:nvSpPr>
         <p:spPr>
           <a:xfrm>
-            <a:off x="4779996" y="1469590"/>
-            <a:ext cx="2514588" cy="923330"/>
+            <a:off x="4687747" y="1469590"/>
+            <a:ext cx="2606837" cy="923330"/>
           </a:xfrm>
           <a:prstGeom prst="rect">
             <a:avLst/>
@@ -26048,8 +26548,8 @@
         </p:nvSpPr>
         <p:spPr>
           <a:xfrm>
-            <a:off x="4779996" y="3248623"/>
-            <a:ext cx="2514588" cy="923330"/>
+            <a:off x="4687747" y="3248623"/>
+            <a:ext cx="2606837" cy="923330"/>
           </a:xfrm>
           <a:prstGeom prst="rect">
             <a:avLst/>
@@ -26235,8 +26735,8 @@
         </p:nvSpPr>
         <p:spPr>
           <a:xfrm>
-            <a:off x="4779996" y="4992106"/>
-            <a:ext cx="2876962" cy="923330"/>
+            <a:off x="4687747" y="4992106"/>
+            <a:ext cx="2969211" cy="923330"/>
           </a:xfrm>
           <a:prstGeom prst="rect">
             <a:avLst/>
@@ -26255,9 +26755,19 @@
             </a:r>
             <a:r>
               <a:rPr lang="en-US" dirty="0"/>
-              <a:t> Use the model on unlabeled data to inform clinical decisions</a:t>
-            </a:r>
-            <a:endParaRPr lang="en-US" b="1" dirty="0"/>
+              <a:t> Use the model on unlabeled data to </a:t>
+            </a:r>
+            <a:r>
+              <a:rPr lang="en-US" b="1" dirty="0">
+                <a:solidFill>
+                  <a:schemeClr val="bg2">
+                    <a:lumMod val="60000"/>
+                    <a:lumOff val="40000"/>
+                  </a:schemeClr>
+                </a:solidFill>
+              </a:rPr>
+              <a:t>inform a decisions</a:t>
+            </a:r>
           </a:p>
         </p:txBody>
       </p:sp>
@@ -26330,6 +26840,18 @@
           <a:prstGeom prst="rect">
             <a:avLst/>
           </a:prstGeom>
+          <a:solidFill>
+            <a:schemeClr val="bg2">
+              <a:lumMod val="75000"/>
+            </a:schemeClr>
+          </a:solidFill>
+          <a:ln>
+            <a:solidFill>
+              <a:schemeClr val="bg2">
+                <a:lumMod val="50000"/>
+              </a:schemeClr>
+            </a:solidFill>
+          </a:ln>
         </p:spPr>
         <p:style>
           <a:lnRef idx="2">
@@ -26354,7 +26876,7 @@
             <a:pPr algn="ctr"/>
             <a:r>
               <a:rPr lang="en-US" dirty="0"/>
-              <a:t>Inform Decision</a:t>
+              <a:t>Informed Decision</a:t>
             </a:r>
           </a:p>
         </p:txBody>
@@ -27086,7 +27608,7 @@
         </p:nvSpPr>
         <p:spPr>
           <a:xfrm>
-            <a:off x="8957502" y="6277122"/>
+            <a:off x="8957502" y="6288697"/>
             <a:ext cx="2836842" cy="479389"/>
           </a:xfrm>
           <a:prstGeom prst="rect">
@@ -27167,7 +27689,7 @@
         </p:nvSpPr>
         <p:spPr>
           <a:xfrm>
-            <a:off x="10009410" y="2844941"/>
+            <a:off x="10009410" y="2856516"/>
             <a:ext cx="1712498" cy="905241"/>
           </a:xfrm>
           <a:prstGeom prst="rect">
@@ -27352,7 +27874,7 @@
         </p:nvSpPr>
         <p:spPr>
           <a:xfrm>
-            <a:off x="5450214" y="2844941"/>
+            <a:off x="5450214" y="2856516"/>
             <a:ext cx="4559195" cy="905241"/>
           </a:xfrm>
           <a:prstGeom prst="rightArrow">
@@ -27405,7 +27927,7 @@
         </p:nvSpPr>
         <p:spPr>
           <a:xfrm>
-            <a:off x="7812806" y="3066909"/>
+            <a:off x="7812806" y="3078484"/>
             <a:ext cx="1188720" cy="457200"/>
           </a:xfrm>
           <a:prstGeom prst="rect">
@@ -27459,7 +27981,7 @@
         </p:nvCxnSpPr>
         <p:spPr>
           <a:xfrm>
-            <a:off x="6884309" y="3518869"/>
+            <a:off x="6884309" y="3530444"/>
             <a:ext cx="0" cy="597886"/>
           </a:xfrm>
           <a:prstGeom prst="straightConnector1">
@@ -27504,7 +28026,7 @@
         </p:nvCxnSpPr>
         <p:spPr>
           <a:xfrm flipV="1">
-            <a:off x="8403356" y="3524109"/>
+            <a:off x="8403356" y="3535684"/>
             <a:ext cx="3810" cy="608443"/>
           </a:xfrm>
           <a:prstGeom prst="straightConnector1">
@@ -27546,7 +28068,7 @@
         </p:nvSpPr>
         <p:spPr>
           <a:xfrm>
-            <a:off x="5659653" y="1134319"/>
+            <a:off x="5659653" y="1145894"/>
             <a:ext cx="1188720" cy="457200"/>
           </a:xfrm>
           <a:prstGeom prst="rect">
@@ -27598,7 +28120,7 @@
         </p:nvSpPr>
         <p:spPr>
           <a:xfrm>
-            <a:off x="7087260" y="1144876"/>
+            <a:off x="7087260" y="1156451"/>
             <a:ext cx="1371600" cy="457200"/>
           </a:xfrm>
           <a:prstGeom prst="rect">
@@ -27654,7 +28176,7 @@
         </p:nvCxnSpPr>
         <p:spPr>
           <a:xfrm>
-            <a:off x="6848373" y="1362919"/>
+            <a:off x="6848373" y="1374494"/>
             <a:ext cx="238887" cy="10557"/>
           </a:xfrm>
           <a:prstGeom prst="straightConnector1">
@@ -27696,7 +28218,7 @@
         </p:nvSpPr>
         <p:spPr>
           <a:xfrm>
-            <a:off x="8687602" y="1513011"/>
+            <a:off x="8687602" y="1524586"/>
             <a:ext cx="914115" cy="517552"/>
           </a:xfrm>
           <a:prstGeom prst="mathEqual">
@@ -27760,7 +28282,7 @@
         </p:blipFill>
         <p:spPr bwMode="auto">
           <a:xfrm>
-            <a:off x="8810422" y="833412"/>
+            <a:off x="8810422" y="844987"/>
             <a:ext cx="668474" cy="668474"/>
           </a:xfrm>
           <a:prstGeom prst="rect">
@@ -27792,7 +28314,7 @@
         </p:nvSpPr>
         <p:spPr>
           <a:xfrm>
-            <a:off x="6306829" y="3840657"/>
+            <a:off x="6306829" y="3852232"/>
             <a:ext cx="1188720" cy="457200"/>
           </a:xfrm>
           <a:prstGeom prst="rect">
@@ -27844,7 +28366,7 @@
         </p:nvSpPr>
         <p:spPr>
           <a:xfrm>
-            <a:off x="7734436" y="3851214"/>
+            <a:off x="7734436" y="3862789"/>
             <a:ext cx="1371600" cy="457200"/>
           </a:xfrm>
           <a:prstGeom prst="rect">
@@ -27900,7 +28422,7 @@
         </p:nvCxnSpPr>
         <p:spPr>
           <a:xfrm>
-            <a:off x="7495549" y="4069257"/>
+            <a:off x="7495549" y="4080832"/>
             <a:ext cx="238887" cy="10557"/>
           </a:xfrm>
           <a:prstGeom prst="straightConnector1">
@@ -27942,7 +28464,7 @@
         </p:nvSpPr>
         <p:spPr>
           <a:xfrm>
-            <a:off x="7178700" y="1771787"/>
+            <a:off x="7178700" y="1783362"/>
             <a:ext cx="1188720" cy="457200"/>
           </a:xfrm>
           <a:prstGeom prst="rect">
@@ -27998,7 +28520,7 @@
         </p:nvCxnSpPr>
         <p:spPr>
           <a:xfrm>
-            <a:off x="7773060" y="1602076"/>
+            <a:off x="7773060" y="1613651"/>
             <a:ext cx="0" cy="169711"/>
           </a:xfrm>
           <a:prstGeom prst="straightConnector1">
@@ -28048,7 +28570,7 @@
         </p:blipFill>
         <p:spPr>
           <a:xfrm>
-            <a:off x="9664440" y="1106949"/>
+            <a:off x="9664440" y="1118524"/>
             <a:ext cx="1422967" cy="921760"/>
           </a:xfrm>
           <a:prstGeom prst="rect">
@@ -28085,7 +28607,7 @@
         </p:blipFill>
         <p:spPr bwMode="auto">
           <a:xfrm>
-            <a:off x="7345041" y="4992028"/>
+            <a:off x="7345041" y="5003603"/>
             <a:ext cx="1656485" cy="1619070"/>
           </a:xfrm>
           <a:prstGeom prst="rect">
@@ -28125,7 +28647,7 @@
         </p:blipFill>
         <p:spPr>
           <a:xfrm>
-            <a:off x="8195028" y="4893917"/>
+            <a:off x="8195028" y="4905492"/>
             <a:ext cx="1422967" cy="921760"/>
           </a:xfrm>
           <a:prstGeom prst="rect">

</xml_diff>

<commit_message>
updated for 2025 guest lecture (minor changes)
</commit_message>
<xml_diff>
--- a/clinically_useful_ML_prediction.pptx
+++ b/clinically_useful_ML_prediction.pptx
@@ -177,16 +177,32 @@
 </p:cmAuthorLst>
 </file>
 
-<file path=ppt/revisionInfo.xml><?xml version="1.0" encoding="utf-8"?>
-<p1510:revInfo xmlns:a="http://schemas.openxmlformats.org/drawingml/2006/main" xmlns:r="http://schemas.openxmlformats.org/officeDocument/2006/relationships" xmlns:p1510="http://schemas.microsoft.com/office/powerpoint/2015/10/main">
-  <p1510:revLst>
-    <p1510:client id="{9E839486-12B6-2047-8452-65108EC110BD}" v="13" dt="2024-01-19T01:48:59.489"/>
-  </p1510:revLst>
-</p1510:revInfo>
-</file>
-
 <file path=ppt/changesInfos/changesInfo1.xml><?xml version="1.0" encoding="utf-8"?>
 <pc:chgInfo xmlns:a="http://schemas.openxmlformats.org/drawingml/2006/main" xmlns:r="http://schemas.openxmlformats.org/officeDocument/2006/relationships" xmlns:ac="http://schemas.microsoft.com/office/drawing/2013/main/command" xmlns:pc="http://schemas.microsoft.com/office/powerpoint/2013/main/command">
+  <pc:docChgLst>
+    <pc:chgData name="Alton Russell, Prof" userId="06708d83-fc2b-4190-b0c8-dc9a4695075b" providerId="ADAL" clId="{DD9B2737-E47F-5343-91B0-4145F30BD325}"/>
+    <pc:docChg chg="modSld">
+      <pc:chgData name="Alton Russell, Prof" userId="06708d83-fc2b-4190-b0c8-dc9a4695075b" providerId="ADAL" clId="{DD9B2737-E47F-5343-91B0-4145F30BD325}" dt="2025-04-02T16:56:42.616" v="7" actId="20577"/>
+      <pc:docMkLst>
+        <pc:docMk/>
+      </pc:docMkLst>
+      <pc:sldChg chg="modSp mod">
+        <pc:chgData name="Alton Russell, Prof" userId="06708d83-fc2b-4190-b0c8-dc9a4695075b" providerId="ADAL" clId="{DD9B2737-E47F-5343-91B0-4145F30BD325}" dt="2025-04-02T16:56:42.616" v="7" actId="20577"/>
+        <pc:sldMkLst>
+          <pc:docMk/>
+          <pc:sldMk cId="2822993626" sldId="290"/>
+        </pc:sldMkLst>
+        <pc:spChg chg="mod">
+          <ac:chgData name="Alton Russell, Prof" userId="06708d83-fc2b-4190-b0c8-dc9a4695075b" providerId="ADAL" clId="{DD9B2737-E47F-5343-91B0-4145F30BD325}" dt="2025-04-02T16:56:42.616" v="7" actId="20577"/>
+          <ac:spMkLst>
+            <pc:docMk/>
+            <pc:sldMk cId="2822993626" sldId="290"/>
+            <ac:spMk id="13" creationId="{7804BA24-30DE-449F-B7DE-7684FF252316}"/>
+          </ac:spMkLst>
+        </pc:spChg>
+      </pc:sldChg>
+    </pc:docChg>
+  </pc:docChgLst>
   <pc:docChgLst>
     <pc:chgData name="Alton Russell, Prof." userId="06708d83-fc2b-4190-b0c8-dc9a4695075b" providerId="ADAL" clId="{5279EF03-CDA8-D342-B53D-9002005459D1}"/>
     <pc:docChg chg="undo custSel addSld delSld modSld">
@@ -200,14 +216,6 @@
           <pc:docMk/>
           <pc:sldMk cId="1474347164" sldId="421"/>
         </pc:sldMkLst>
-        <pc:spChg chg="mod">
-          <ac:chgData name="Alton Russell, Prof." userId="06708d83-fc2b-4190-b0c8-dc9a4695075b" providerId="ADAL" clId="{5279EF03-CDA8-D342-B53D-9002005459D1}" dt="2023-03-20T16:12:16.365" v="158" actId="20577"/>
-          <ac:spMkLst>
-            <pc:docMk/>
-            <pc:sldMk cId="1474347164" sldId="421"/>
-            <ac:spMk id="2" creationId="{15003B89-9BFD-4AA4-975B-CCC8CDC3CDB9}"/>
-          </ac:spMkLst>
-        </pc:spChg>
       </pc:sldChg>
       <pc:sldChg chg="modSp mod">
         <pc:chgData name="Alton Russell, Prof." userId="06708d83-fc2b-4190-b0c8-dc9a4695075b" providerId="ADAL" clId="{5279EF03-CDA8-D342-B53D-9002005459D1}" dt="2023-03-20T16:08:58.444" v="111" actId="20577"/>
@@ -215,14 +223,6 @@
           <pc:docMk/>
           <pc:sldMk cId="1921209194" sldId="429"/>
         </pc:sldMkLst>
-        <pc:spChg chg="mod">
-          <ac:chgData name="Alton Russell, Prof." userId="06708d83-fc2b-4190-b0c8-dc9a4695075b" providerId="ADAL" clId="{5279EF03-CDA8-D342-B53D-9002005459D1}" dt="2023-03-20T16:08:58.444" v="111" actId="20577"/>
-          <ac:spMkLst>
-            <pc:docMk/>
-            <pc:sldMk cId="1921209194" sldId="429"/>
-            <ac:spMk id="3" creationId="{ABD7474D-4D81-44B8-90AA-34BCC1809C48}"/>
-          </ac:spMkLst>
-        </pc:spChg>
       </pc:sldChg>
       <pc:sldChg chg="addSp delSp modSp modAnim">
         <pc:chgData name="Alton Russell, Prof." userId="06708d83-fc2b-4190-b0c8-dc9a4695075b" providerId="ADAL" clId="{5279EF03-CDA8-D342-B53D-9002005459D1}" dt="2023-03-22T13:08:13.482" v="162"/>
@@ -230,150 +230,6 @@
           <pc:docMk/>
           <pc:sldMk cId="1224476269" sldId="441"/>
         </pc:sldMkLst>
-        <pc:spChg chg="add del mod">
-          <ac:chgData name="Alton Russell, Prof." userId="06708d83-fc2b-4190-b0c8-dc9a4695075b" providerId="ADAL" clId="{5279EF03-CDA8-D342-B53D-9002005459D1}" dt="2023-03-22T13:08:13.482" v="162"/>
-          <ac:spMkLst>
-            <pc:docMk/>
-            <pc:sldMk cId="1224476269" sldId="441"/>
-            <ac:spMk id="3" creationId="{C9408F0A-C31D-9DD6-9214-1CC81E9D051D}"/>
-          </ac:spMkLst>
-        </pc:spChg>
-        <pc:spChg chg="add del mod">
-          <ac:chgData name="Alton Russell, Prof." userId="06708d83-fc2b-4190-b0c8-dc9a4695075b" providerId="ADAL" clId="{5279EF03-CDA8-D342-B53D-9002005459D1}" dt="2023-03-22T13:08:13.482" v="162"/>
-          <ac:spMkLst>
-            <pc:docMk/>
-            <pc:sldMk cId="1224476269" sldId="441"/>
-            <ac:spMk id="22" creationId="{4776AB14-F84E-99E3-B81B-17489885CE91}"/>
-          </ac:spMkLst>
-        </pc:spChg>
-        <pc:spChg chg="add del mod">
-          <ac:chgData name="Alton Russell, Prof." userId="06708d83-fc2b-4190-b0c8-dc9a4695075b" providerId="ADAL" clId="{5279EF03-CDA8-D342-B53D-9002005459D1}" dt="2023-03-22T13:08:13.482" v="162"/>
-          <ac:spMkLst>
-            <pc:docMk/>
-            <pc:sldMk cId="1224476269" sldId="441"/>
-            <ac:spMk id="23" creationId="{EA467B54-3260-B00A-D48B-A0243BFD1B2E}"/>
-          </ac:spMkLst>
-        </pc:spChg>
-        <pc:spChg chg="add del mod">
-          <ac:chgData name="Alton Russell, Prof." userId="06708d83-fc2b-4190-b0c8-dc9a4695075b" providerId="ADAL" clId="{5279EF03-CDA8-D342-B53D-9002005459D1}" dt="2023-03-22T13:08:13.482" v="162"/>
-          <ac:spMkLst>
-            <pc:docMk/>
-            <pc:sldMk cId="1224476269" sldId="441"/>
-            <ac:spMk id="24" creationId="{F90086A7-5CB3-31FA-1F99-584ADBAFD743}"/>
-          </ac:spMkLst>
-        </pc:spChg>
-        <pc:spChg chg="add del mod">
-          <ac:chgData name="Alton Russell, Prof." userId="06708d83-fc2b-4190-b0c8-dc9a4695075b" providerId="ADAL" clId="{5279EF03-CDA8-D342-B53D-9002005459D1}" dt="2023-03-22T13:08:13.482" v="162"/>
-          <ac:spMkLst>
-            <pc:docMk/>
-            <pc:sldMk cId="1224476269" sldId="441"/>
-            <ac:spMk id="25" creationId="{269934FE-FFB2-3974-26F2-1BB5FDECB9A0}"/>
-          </ac:spMkLst>
-        </pc:spChg>
-        <pc:spChg chg="add del mod">
-          <ac:chgData name="Alton Russell, Prof." userId="06708d83-fc2b-4190-b0c8-dc9a4695075b" providerId="ADAL" clId="{5279EF03-CDA8-D342-B53D-9002005459D1}" dt="2023-03-22T13:08:13.482" v="162"/>
-          <ac:spMkLst>
-            <pc:docMk/>
-            <pc:sldMk cId="1224476269" sldId="441"/>
-            <ac:spMk id="26" creationId="{4D0E64A1-70D2-B934-EA37-5FBBF334E3F5}"/>
-          </ac:spMkLst>
-        </pc:spChg>
-        <pc:spChg chg="add del mod">
-          <ac:chgData name="Alton Russell, Prof." userId="06708d83-fc2b-4190-b0c8-dc9a4695075b" providerId="ADAL" clId="{5279EF03-CDA8-D342-B53D-9002005459D1}" dt="2023-03-22T13:08:13.482" v="162"/>
-          <ac:spMkLst>
-            <pc:docMk/>
-            <pc:sldMk cId="1224476269" sldId="441"/>
-            <ac:spMk id="27" creationId="{2930FF79-EBD4-3608-F208-59F9805E4CA5}"/>
-          </ac:spMkLst>
-        </pc:spChg>
-        <pc:spChg chg="add del mod">
-          <ac:chgData name="Alton Russell, Prof." userId="06708d83-fc2b-4190-b0c8-dc9a4695075b" providerId="ADAL" clId="{5279EF03-CDA8-D342-B53D-9002005459D1}" dt="2023-03-22T13:08:13.482" v="162"/>
-          <ac:spMkLst>
-            <pc:docMk/>
-            <pc:sldMk cId="1224476269" sldId="441"/>
-            <ac:spMk id="28" creationId="{B0B9F0E0-8F0E-C658-F963-E07ED015270C}"/>
-          </ac:spMkLst>
-        </pc:spChg>
-        <pc:spChg chg="add del mod">
-          <ac:chgData name="Alton Russell, Prof." userId="06708d83-fc2b-4190-b0c8-dc9a4695075b" providerId="ADAL" clId="{5279EF03-CDA8-D342-B53D-9002005459D1}" dt="2023-03-22T13:08:13.482" v="162"/>
-          <ac:spMkLst>
-            <pc:docMk/>
-            <pc:sldMk cId="1224476269" sldId="441"/>
-            <ac:spMk id="29" creationId="{50EE9B1B-4136-EECD-9296-50D7B971EBEC}"/>
-          </ac:spMkLst>
-        </pc:spChg>
-        <pc:spChg chg="add del mod">
-          <ac:chgData name="Alton Russell, Prof." userId="06708d83-fc2b-4190-b0c8-dc9a4695075b" providerId="ADAL" clId="{5279EF03-CDA8-D342-B53D-9002005459D1}" dt="2023-03-22T13:08:13.482" v="162"/>
-          <ac:spMkLst>
-            <pc:docMk/>
-            <pc:sldMk cId="1224476269" sldId="441"/>
-            <ac:spMk id="30" creationId="{B6FE41FC-DE1F-B841-3526-61D556B4A428}"/>
-          </ac:spMkLst>
-        </pc:spChg>
-        <pc:spChg chg="add del mod">
-          <ac:chgData name="Alton Russell, Prof." userId="06708d83-fc2b-4190-b0c8-dc9a4695075b" providerId="ADAL" clId="{5279EF03-CDA8-D342-B53D-9002005459D1}" dt="2023-03-22T13:08:13.482" v="162"/>
-          <ac:spMkLst>
-            <pc:docMk/>
-            <pc:sldMk cId="1224476269" sldId="441"/>
-            <ac:spMk id="31" creationId="{F4FDF7C8-2309-3B1A-43AD-95AEAE5E2730}"/>
-          </ac:spMkLst>
-        </pc:spChg>
-        <pc:spChg chg="add del mod">
-          <ac:chgData name="Alton Russell, Prof." userId="06708d83-fc2b-4190-b0c8-dc9a4695075b" providerId="ADAL" clId="{5279EF03-CDA8-D342-B53D-9002005459D1}" dt="2023-03-22T13:08:13.482" v="162"/>
-          <ac:spMkLst>
-            <pc:docMk/>
-            <pc:sldMk cId="1224476269" sldId="441"/>
-            <ac:spMk id="32" creationId="{7AAF574F-B24F-C563-820A-8B5EE86FDB2F}"/>
-          </ac:spMkLst>
-        </pc:spChg>
-        <pc:spChg chg="add del mod">
-          <ac:chgData name="Alton Russell, Prof." userId="06708d83-fc2b-4190-b0c8-dc9a4695075b" providerId="ADAL" clId="{5279EF03-CDA8-D342-B53D-9002005459D1}" dt="2023-03-22T13:08:13.482" v="162"/>
-          <ac:spMkLst>
-            <pc:docMk/>
-            <pc:sldMk cId="1224476269" sldId="441"/>
-            <ac:spMk id="33" creationId="{66CB738A-5C0C-5E1A-D593-CE54D98FAF3E}"/>
-          </ac:spMkLst>
-        </pc:spChg>
-        <pc:spChg chg="add del mod">
-          <ac:chgData name="Alton Russell, Prof." userId="06708d83-fc2b-4190-b0c8-dc9a4695075b" providerId="ADAL" clId="{5279EF03-CDA8-D342-B53D-9002005459D1}" dt="2023-03-22T13:08:13.482" v="162"/>
-          <ac:spMkLst>
-            <pc:docMk/>
-            <pc:sldMk cId="1224476269" sldId="441"/>
-            <ac:spMk id="34" creationId="{A99B94A8-09C4-619F-2BE4-D6FB577071A6}"/>
-          </ac:spMkLst>
-        </pc:spChg>
-        <pc:spChg chg="add del mod">
-          <ac:chgData name="Alton Russell, Prof." userId="06708d83-fc2b-4190-b0c8-dc9a4695075b" providerId="ADAL" clId="{5279EF03-CDA8-D342-B53D-9002005459D1}" dt="2023-03-22T13:08:13.482" v="162"/>
-          <ac:spMkLst>
-            <pc:docMk/>
-            <pc:sldMk cId="1224476269" sldId="441"/>
-            <ac:spMk id="35" creationId="{FAC381D8-875F-E705-D41D-B007BD9AD287}"/>
-          </ac:spMkLst>
-        </pc:spChg>
-        <pc:spChg chg="add del mod">
-          <ac:chgData name="Alton Russell, Prof." userId="06708d83-fc2b-4190-b0c8-dc9a4695075b" providerId="ADAL" clId="{5279EF03-CDA8-D342-B53D-9002005459D1}" dt="2023-03-22T13:08:13.482" v="162"/>
-          <ac:spMkLst>
-            <pc:docMk/>
-            <pc:sldMk cId="1224476269" sldId="441"/>
-            <ac:spMk id="36" creationId="{7BE7957E-5641-3629-A181-BFDB7CA60775}"/>
-          </ac:spMkLst>
-        </pc:spChg>
-        <pc:spChg chg="add del mod">
-          <ac:chgData name="Alton Russell, Prof." userId="06708d83-fc2b-4190-b0c8-dc9a4695075b" providerId="ADAL" clId="{5279EF03-CDA8-D342-B53D-9002005459D1}" dt="2023-03-22T13:08:13.482" v="162"/>
-          <ac:spMkLst>
-            <pc:docMk/>
-            <pc:sldMk cId="1224476269" sldId="441"/>
-            <ac:spMk id="37" creationId="{88B70B2A-612F-A8D0-6C10-1555502A4AC1}"/>
-          </ac:spMkLst>
-        </pc:spChg>
-        <pc:spChg chg="add del mod">
-          <ac:chgData name="Alton Russell, Prof." userId="06708d83-fc2b-4190-b0c8-dc9a4695075b" providerId="ADAL" clId="{5279EF03-CDA8-D342-B53D-9002005459D1}" dt="2023-03-22T13:08:13.482" v="162"/>
-          <ac:spMkLst>
-            <pc:docMk/>
-            <pc:sldMk cId="1224476269" sldId="441"/>
-            <ac:spMk id="38" creationId="{C0F9EFEC-C244-F0F0-CEF2-948845571A22}"/>
-          </ac:spMkLst>
-        </pc:spChg>
       </pc:sldChg>
       <pc:sldChg chg="modSp mod">
         <pc:chgData name="Alton Russell, Prof." userId="06708d83-fc2b-4190-b0c8-dc9a4695075b" providerId="ADAL" clId="{5279EF03-CDA8-D342-B53D-9002005459D1}" dt="2023-03-22T13:10:54.902" v="165" actId="1036"/>
@@ -381,166 +237,6 @@
           <pc:docMk/>
           <pc:sldMk cId="1718940314" sldId="443"/>
         </pc:sldMkLst>
-        <pc:spChg chg="mod">
-          <ac:chgData name="Alton Russell, Prof." userId="06708d83-fc2b-4190-b0c8-dc9a4695075b" providerId="ADAL" clId="{5279EF03-CDA8-D342-B53D-9002005459D1}" dt="2023-03-22T13:09:06.087" v="164" actId="1076"/>
-          <ac:spMkLst>
-            <pc:docMk/>
-            <pc:sldMk cId="1718940314" sldId="443"/>
-            <ac:spMk id="2" creationId="{3C5477A3-8DFB-4598-B2C7-4E338552EE9A}"/>
-          </ac:spMkLst>
-        </pc:spChg>
-        <pc:spChg chg="mod">
-          <ac:chgData name="Alton Russell, Prof." userId="06708d83-fc2b-4190-b0c8-dc9a4695075b" providerId="ADAL" clId="{5279EF03-CDA8-D342-B53D-9002005459D1}" dt="2023-03-22T13:10:54.902" v="165" actId="1036"/>
-          <ac:spMkLst>
-            <pc:docMk/>
-            <pc:sldMk cId="1718940314" sldId="443"/>
-            <ac:spMk id="4" creationId="{E2598CBF-6EB1-4ED2-AE62-D252041E8772}"/>
-          </ac:spMkLst>
-        </pc:spChg>
-        <pc:spChg chg="mod">
-          <ac:chgData name="Alton Russell, Prof." userId="06708d83-fc2b-4190-b0c8-dc9a4695075b" providerId="ADAL" clId="{5279EF03-CDA8-D342-B53D-9002005459D1}" dt="2023-03-22T13:10:54.902" v="165" actId="1036"/>
-          <ac:spMkLst>
-            <pc:docMk/>
-            <pc:sldMk cId="1718940314" sldId="443"/>
-            <ac:spMk id="11" creationId="{2170B4EB-6CCB-4D47-A840-150E9D4A7CB0}"/>
-          </ac:spMkLst>
-        </pc:spChg>
-        <pc:spChg chg="mod">
-          <ac:chgData name="Alton Russell, Prof." userId="06708d83-fc2b-4190-b0c8-dc9a4695075b" providerId="ADAL" clId="{5279EF03-CDA8-D342-B53D-9002005459D1}" dt="2023-03-22T13:10:54.902" v="165" actId="1036"/>
-          <ac:spMkLst>
-            <pc:docMk/>
-            <pc:sldMk cId="1718940314" sldId="443"/>
-            <ac:spMk id="14" creationId="{C12A9F8E-E676-49B6-B41B-E329A208745F}"/>
-          </ac:spMkLst>
-        </pc:spChg>
-        <pc:spChg chg="mod">
-          <ac:chgData name="Alton Russell, Prof." userId="06708d83-fc2b-4190-b0c8-dc9a4695075b" providerId="ADAL" clId="{5279EF03-CDA8-D342-B53D-9002005459D1}" dt="2023-03-22T13:10:54.902" v="165" actId="1036"/>
-          <ac:spMkLst>
-            <pc:docMk/>
-            <pc:sldMk cId="1718940314" sldId="443"/>
-            <ac:spMk id="15" creationId="{AE8ACDAB-A507-439F-9F95-3951A3F1EDE9}"/>
-          </ac:spMkLst>
-        </pc:spChg>
-        <pc:spChg chg="mod">
-          <ac:chgData name="Alton Russell, Prof." userId="06708d83-fc2b-4190-b0c8-dc9a4695075b" providerId="ADAL" clId="{5279EF03-CDA8-D342-B53D-9002005459D1}" dt="2023-03-22T13:10:54.902" v="165" actId="1036"/>
-          <ac:spMkLst>
-            <pc:docMk/>
-            <pc:sldMk cId="1718940314" sldId="443"/>
-            <ac:spMk id="16" creationId="{F625E7FF-18E4-4E77-B311-8974B808DC30}"/>
-          </ac:spMkLst>
-        </pc:spChg>
-        <pc:spChg chg="mod">
-          <ac:chgData name="Alton Russell, Prof." userId="06708d83-fc2b-4190-b0c8-dc9a4695075b" providerId="ADAL" clId="{5279EF03-CDA8-D342-B53D-9002005459D1}" dt="2023-03-22T13:10:54.902" v="165" actId="1036"/>
-          <ac:spMkLst>
-            <pc:docMk/>
-            <pc:sldMk cId="1718940314" sldId="443"/>
-            <ac:spMk id="22" creationId="{4F661371-ABA5-4483-AA06-3E76B2E0F069}"/>
-          </ac:spMkLst>
-        </pc:spChg>
-        <pc:spChg chg="mod">
-          <ac:chgData name="Alton Russell, Prof." userId="06708d83-fc2b-4190-b0c8-dc9a4695075b" providerId="ADAL" clId="{5279EF03-CDA8-D342-B53D-9002005459D1}" dt="2023-03-22T13:10:54.902" v="165" actId="1036"/>
-          <ac:spMkLst>
-            <pc:docMk/>
-            <pc:sldMk cId="1718940314" sldId="443"/>
-            <ac:spMk id="23" creationId="{BA729344-344C-4C29-AC92-299F884A3A4E}"/>
-          </ac:spMkLst>
-        </pc:spChg>
-        <pc:spChg chg="mod">
-          <ac:chgData name="Alton Russell, Prof." userId="06708d83-fc2b-4190-b0c8-dc9a4695075b" providerId="ADAL" clId="{5279EF03-CDA8-D342-B53D-9002005459D1}" dt="2023-03-22T13:10:54.902" v="165" actId="1036"/>
-          <ac:spMkLst>
-            <pc:docMk/>
-            <pc:sldMk cId="1718940314" sldId="443"/>
-            <ac:spMk id="24" creationId="{B66898FA-D9E5-4BC4-8C0A-F17E8E1BE38B}"/>
-          </ac:spMkLst>
-        </pc:spChg>
-        <pc:spChg chg="mod">
-          <ac:chgData name="Alton Russell, Prof." userId="06708d83-fc2b-4190-b0c8-dc9a4695075b" providerId="ADAL" clId="{5279EF03-CDA8-D342-B53D-9002005459D1}" dt="2023-03-22T13:10:54.902" v="165" actId="1036"/>
-          <ac:spMkLst>
-            <pc:docMk/>
-            <pc:sldMk cId="1718940314" sldId="443"/>
-            <ac:spMk id="27" creationId="{1D2FE8AC-6ECF-4B66-87F5-466EFE5C5CE1}"/>
-          </ac:spMkLst>
-        </pc:spChg>
-        <pc:spChg chg="mod">
-          <ac:chgData name="Alton Russell, Prof." userId="06708d83-fc2b-4190-b0c8-dc9a4695075b" providerId="ADAL" clId="{5279EF03-CDA8-D342-B53D-9002005459D1}" dt="2023-03-22T13:10:54.902" v="165" actId="1036"/>
-          <ac:spMkLst>
-            <pc:docMk/>
-            <pc:sldMk cId="1718940314" sldId="443"/>
-            <ac:spMk id="29" creationId="{1199488E-6335-433D-B7DB-F7CA7B84B8A7}"/>
-          </ac:spMkLst>
-        </pc:spChg>
-        <pc:picChg chg="mod">
-          <ac:chgData name="Alton Russell, Prof." userId="06708d83-fc2b-4190-b0c8-dc9a4695075b" providerId="ADAL" clId="{5279EF03-CDA8-D342-B53D-9002005459D1}" dt="2023-03-22T13:10:54.902" v="165" actId="1036"/>
-          <ac:picMkLst>
-            <pc:docMk/>
-            <pc:sldMk cId="1718940314" sldId="443"/>
-            <ac:picMk id="33" creationId="{6E2F5CB6-93FA-4B18-87BB-7029057E54A1}"/>
-          </ac:picMkLst>
-        </pc:picChg>
-        <pc:picChg chg="mod">
-          <ac:chgData name="Alton Russell, Prof." userId="06708d83-fc2b-4190-b0c8-dc9a4695075b" providerId="ADAL" clId="{5279EF03-CDA8-D342-B53D-9002005459D1}" dt="2023-03-22T13:10:54.902" v="165" actId="1036"/>
-          <ac:picMkLst>
-            <pc:docMk/>
-            <pc:sldMk cId="1718940314" sldId="443"/>
-            <ac:picMk id="36" creationId="{382EF769-D697-4A30-A0F6-30FD30774A57}"/>
-          </ac:picMkLst>
-        </pc:picChg>
-        <pc:picChg chg="mod">
-          <ac:chgData name="Alton Russell, Prof." userId="06708d83-fc2b-4190-b0c8-dc9a4695075b" providerId="ADAL" clId="{5279EF03-CDA8-D342-B53D-9002005459D1}" dt="2023-03-22T13:10:54.902" v="165" actId="1036"/>
-          <ac:picMkLst>
-            <pc:docMk/>
-            <pc:sldMk cId="1718940314" sldId="443"/>
-            <ac:picMk id="1030" creationId="{A15D61D9-3BDA-41D3-AFE2-3DB9F51D2A62}"/>
-          </ac:picMkLst>
-        </pc:picChg>
-        <pc:picChg chg="mod">
-          <ac:chgData name="Alton Russell, Prof." userId="06708d83-fc2b-4190-b0c8-dc9a4695075b" providerId="ADAL" clId="{5279EF03-CDA8-D342-B53D-9002005459D1}" dt="2023-03-22T13:10:54.902" v="165" actId="1036"/>
-          <ac:picMkLst>
-            <pc:docMk/>
-            <pc:sldMk cId="1718940314" sldId="443"/>
-            <ac:picMk id="1032" creationId="{6CC2F96A-C141-4815-AAAE-50E36D5D6D51}"/>
-          </ac:picMkLst>
-        </pc:picChg>
-        <pc:cxnChg chg="mod">
-          <ac:chgData name="Alton Russell, Prof." userId="06708d83-fc2b-4190-b0c8-dc9a4695075b" providerId="ADAL" clId="{5279EF03-CDA8-D342-B53D-9002005459D1}" dt="2023-03-22T13:10:54.902" v="165" actId="1036"/>
-          <ac:cxnSpMkLst>
-            <pc:docMk/>
-            <pc:sldMk cId="1718940314" sldId="443"/>
-            <ac:cxnSpMk id="20" creationId="{DFC70D22-B79F-47E3-B52A-3E5743961DF9}"/>
-          </ac:cxnSpMkLst>
-        </pc:cxnChg>
-        <pc:cxnChg chg="mod">
-          <ac:chgData name="Alton Russell, Prof." userId="06708d83-fc2b-4190-b0c8-dc9a4695075b" providerId="ADAL" clId="{5279EF03-CDA8-D342-B53D-9002005459D1}" dt="2023-03-22T13:10:54.902" v="165" actId="1036"/>
-          <ac:cxnSpMkLst>
-            <pc:docMk/>
-            <pc:sldMk cId="1718940314" sldId="443"/>
-            <ac:cxnSpMk id="28" creationId="{4EAC9C11-472A-4121-84E6-32700DD71E78}"/>
-          </ac:cxnSpMkLst>
-        </pc:cxnChg>
-        <pc:cxnChg chg="mod">
-          <ac:chgData name="Alton Russell, Prof." userId="06708d83-fc2b-4190-b0c8-dc9a4695075b" providerId="ADAL" clId="{5279EF03-CDA8-D342-B53D-9002005459D1}" dt="2023-03-22T13:10:54.902" v="165" actId="1036"/>
-          <ac:cxnSpMkLst>
-            <pc:docMk/>
-            <pc:sldMk cId="1718940314" sldId="443"/>
-            <ac:cxnSpMk id="30" creationId="{19D545F9-9088-42E2-A449-1B20AD53ED41}"/>
-          </ac:cxnSpMkLst>
-        </pc:cxnChg>
-        <pc:cxnChg chg="mod">
-          <ac:chgData name="Alton Russell, Prof." userId="06708d83-fc2b-4190-b0c8-dc9a4695075b" providerId="ADAL" clId="{5279EF03-CDA8-D342-B53D-9002005459D1}" dt="2023-03-22T13:10:54.902" v="165" actId="1036"/>
-          <ac:cxnSpMkLst>
-            <pc:docMk/>
-            <pc:sldMk cId="1718940314" sldId="443"/>
-            <ac:cxnSpMk id="32" creationId="{C1543EE5-9818-4D99-9B89-CBCCFE600414}"/>
-          </ac:cxnSpMkLst>
-        </pc:cxnChg>
-        <pc:cxnChg chg="mod">
-          <ac:chgData name="Alton Russell, Prof." userId="06708d83-fc2b-4190-b0c8-dc9a4695075b" providerId="ADAL" clId="{5279EF03-CDA8-D342-B53D-9002005459D1}" dt="2023-03-22T13:10:54.902" v="165" actId="1036"/>
-          <ac:cxnSpMkLst>
-            <pc:docMk/>
-            <pc:sldMk cId="1718940314" sldId="443"/>
-            <ac:cxnSpMk id="35" creationId="{CA7982E0-AFE3-44EB-A4F4-C85E21AF74F1}"/>
-          </ac:cxnSpMkLst>
-        </pc:cxnChg>
       </pc:sldChg>
       <pc:sldChg chg="modAnim">
         <pc:chgData name="Alton Russell, Prof." userId="06708d83-fc2b-4190-b0c8-dc9a4695075b" providerId="ADAL" clId="{5279EF03-CDA8-D342-B53D-9002005459D1}" dt="2023-03-20T16:05:49.642" v="0"/>
@@ -555,94 +251,6 @@
           <pc:docMk/>
           <pc:sldMk cId="3062542047" sldId="447"/>
         </pc:sldMkLst>
-        <pc:spChg chg="mod">
-          <ac:chgData name="Alton Russell, Prof." userId="06708d83-fc2b-4190-b0c8-dc9a4695075b" providerId="ADAL" clId="{5279EF03-CDA8-D342-B53D-9002005459D1}" dt="2023-03-22T13:14:29.958" v="166" actId="1036"/>
-          <ac:spMkLst>
-            <pc:docMk/>
-            <pc:sldMk cId="3062542047" sldId="447"/>
-            <ac:spMk id="4" creationId="{2916DA41-A2EB-410B-B9EF-214246C1F471}"/>
-          </ac:spMkLst>
-        </pc:spChg>
-        <pc:spChg chg="mod">
-          <ac:chgData name="Alton Russell, Prof." userId="06708d83-fc2b-4190-b0c8-dc9a4695075b" providerId="ADAL" clId="{5279EF03-CDA8-D342-B53D-9002005459D1}" dt="2023-03-22T13:14:29.958" v="166" actId="1036"/>
-          <ac:spMkLst>
-            <pc:docMk/>
-            <pc:sldMk cId="3062542047" sldId="447"/>
-            <ac:spMk id="5" creationId="{886AE0F5-A1FF-4CD0-9735-07460BE0C30B}"/>
-          </ac:spMkLst>
-        </pc:spChg>
-        <pc:spChg chg="mod">
-          <ac:chgData name="Alton Russell, Prof." userId="06708d83-fc2b-4190-b0c8-dc9a4695075b" providerId="ADAL" clId="{5279EF03-CDA8-D342-B53D-9002005459D1}" dt="2023-03-22T13:14:29.958" v="166" actId="1036"/>
-          <ac:spMkLst>
-            <pc:docMk/>
-            <pc:sldMk cId="3062542047" sldId="447"/>
-            <ac:spMk id="6" creationId="{ECBF3B62-2519-4B03-A79C-8B1149901C2A}"/>
-          </ac:spMkLst>
-        </pc:spChg>
-        <pc:spChg chg="mod">
-          <ac:chgData name="Alton Russell, Prof." userId="06708d83-fc2b-4190-b0c8-dc9a4695075b" providerId="ADAL" clId="{5279EF03-CDA8-D342-B53D-9002005459D1}" dt="2023-03-22T13:14:29.958" v="166" actId="1036"/>
-          <ac:spMkLst>
-            <pc:docMk/>
-            <pc:sldMk cId="3062542047" sldId="447"/>
-            <ac:spMk id="7" creationId="{41C14BB5-8EE8-4232-972F-E865EE91C7B9}"/>
-          </ac:spMkLst>
-        </pc:spChg>
-        <pc:spChg chg="mod">
-          <ac:chgData name="Alton Russell, Prof." userId="06708d83-fc2b-4190-b0c8-dc9a4695075b" providerId="ADAL" clId="{5279EF03-CDA8-D342-B53D-9002005459D1}" dt="2023-03-22T13:14:29.958" v="166" actId="1036"/>
-          <ac:spMkLst>
-            <pc:docMk/>
-            <pc:sldMk cId="3062542047" sldId="447"/>
-            <ac:spMk id="9" creationId="{A1AF4145-2AA7-466E-B38D-BBC3F479E1E3}"/>
-          </ac:spMkLst>
-        </pc:spChg>
-        <pc:spChg chg="mod">
-          <ac:chgData name="Alton Russell, Prof." userId="06708d83-fc2b-4190-b0c8-dc9a4695075b" providerId="ADAL" clId="{5279EF03-CDA8-D342-B53D-9002005459D1}" dt="2023-03-22T13:14:29.958" v="166" actId="1036"/>
-          <ac:spMkLst>
-            <pc:docMk/>
-            <pc:sldMk cId="3062542047" sldId="447"/>
-            <ac:spMk id="11" creationId="{8BF17649-72AA-48DA-B437-5A6AC3DF2446}"/>
-          </ac:spMkLst>
-        </pc:spChg>
-        <pc:spChg chg="mod">
-          <ac:chgData name="Alton Russell, Prof." userId="06708d83-fc2b-4190-b0c8-dc9a4695075b" providerId="ADAL" clId="{5279EF03-CDA8-D342-B53D-9002005459D1}" dt="2023-03-22T13:14:29.958" v="166" actId="1036"/>
-          <ac:spMkLst>
-            <pc:docMk/>
-            <pc:sldMk cId="3062542047" sldId="447"/>
-            <ac:spMk id="14" creationId="{483B6F3A-B2D6-4CD3-9280-11E948BEFCCA}"/>
-          </ac:spMkLst>
-        </pc:spChg>
-        <pc:spChg chg="mod">
-          <ac:chgData name="Alton Russell, Prof." userId="06708d83-fc2b-4190-b0c8-dc9a4695075b" providerId="ADAL" clId="{5279EF03-CDA8-D342-B53D-9002005459D1}" dt="2023-03-22T13:14:29.958" v="166" actId="1036"/>
-          <ac:spMkLst>
-            <pc:docMk/>
-            <pc:sldMk cId="3062542047" sldId="447"/>
-            <ac:spMk id="15" creationId="{0CFBFF64-F5F4-4B1E-8728-7C0575F0DD6B}"/>
-          </ac:spMkLst>
-        </pc:spChg>
-        <pc:spChg chg="mod">
-          <ac:chgData name="Alton Russell, Prof." userId="06708d83-fc2b-4190-b0c8-dc9a4695075b" providerId="ADAL" clId="{5279EF03-CDA8-D342-B53D-9002005459D1}" dt="2023-03-22T13:14:29.958" v="166" actId="1036"/>
-          <ac:spMkLst>
-            <pc:docMk/>
-            <pc:sldMk cId="3062542047" sldId="447"/>
-            <ac:spMk id="16" creationId="{E72423B9-A44A-4C0F-AEFF-C6D2C042B0F6}"/>
-          </ac:spMkLst>
-        </pc:spChg>
-        <pc:spChg chg="mod">
-          <ac:chgData name="Alton Russell, Prof." userId="06708d83-fc2b-4190-b0c8-dc9a4695075b" providerId="ADAL" clId="{5279EF03-CDA8-D342-B53D-9002005459D1}" dt="2023-03-22T13:14:29.958" v="166" actId="1036"/>
-          <ac:spMkLst>
-            <pc:docMk/>
-            <pc:sldMk cId="3062542047" sldId="447"/>
-            <ac:spMk id="17" creationId="{431166C9-9885-4EEB-8837-82ADA68B8F80}"/>
-          </ac:spMkLst>
-        </pc:spChg>
-        <pc:spChg chg="mod">
-          <ac:chgData name="Alton Russell, Prof." userId="06708d83-fc2b-4190-b0c8-dc9a4695075b" providerId="ADAL" clId="{5279EF03-CDA8-D342-B53D-9002005459D1}" dt="2023-03-22T13:14:29.958" v="166" actId="1036"/>
-          <ac:spMkLst>
-            <pc:docMk/>
-            <pc:sldMk cId="3062542047" sldId="447"/>
-            <ac:spMk id="18" creationId="{337DE5C1-3856-464A-81A4-608B6A0AF875}"/>
-          </ac:spMkLst>
-        </pc:spChg>
       </pc:sldChg>
       <pc:sldChg chg="modSp mod">
         <pc:chgData name="Alton Russell, Prof." userId="06708d83-fc2b-4190-b0c8-dc9a4695075b" providerId="ADAL" clId="{5279EF03-CDA8-D342-B53D-9002005459D1}" dt="2023-03-22T13:18:49.111" v="167" actId="1036"/>
@@ -650,38 +258,6 @@
           <pc:docMk/>
           <pc:sldMk cId="72476753" sldId="465"/>
         </pc:sldMkLst>
-        <pc:spChg chg="mod">
-          <ac:chgData name="Alton Russell, Prof." userId="06708d83-fc2b-4190-b0c8-dc9a4695075b" providerId="ADAL" clId="{5279EF03-CDA8-D342-B53D-9002005459D1}" dt="2023-03-22T13:18:49.111" v="167" actId="1036"/>
-          <ac:spMkLst>
-            <pc:docMk/>
-            <pc:sldMk cId="72476753" sldId="465"/>
-            <ac:spMk id="6" creationId="{D5FB1872-1C51-40E4-8344-7198089BEF31}"/>
-          </ac:spMkLst>
-        </pc:spChg>
-        <pc:cxnChg chg="mod">
-          <ac:chgData name="Alton Russell, Prof." userId="06708d83-fc2b-4190-b0c8-dc9a4695075b" providerId="ADAL" clId="{5279EF03-CDA8-D342-B53D-9002005459D1}" dt="2023-03-22T13:18:49.111" v="167" actId="1036"/>
-          <ac:cxnSpMkLst>
-            <pc:docMk/>
-            <pc:sldMk cId="72476753" sldId="465"/>
-            <ac:cxnSpMk id="8" creationId="{03D5E892-E782-4FEC-9712-036648816180}"/>
-          </ac:cxnSpMkLst>
-        </pc:cxnChg>
-        <pc:cxnChg chg="mod">
-          <ac:chgData name="Alton Russell, Prof." userId="06708d83-fc2b-4190-b0c8-dc9a4695075b" providerId="ADAL" clId="{5279EF03-CDA8-D342-B53D-9002005459D1}" dt="2023-03-22T13:18:49.111" v="167" actId="1036"/>
-          <ac:cxnSpMkLst>
-            <pc:docMk/>
-            <pc:sldMk cId="72476753" sldId="465"/>
-            <ac:cxnSpMk id="10" creationId="{A46BB896-BFBC-4314-B340-A3876535A0F7}"/>
-          </ac:cxnSpMkLst>
-        </pc:cxnChg>
-        <pc:cxnChg chg="mod">
-          <ac:chgData name="Alton Russell, Prof." userId="06708d83-fc2b-4190-b0c8-dc9a4695075b" providerId="ADAL" clId="{5279EF03-CDA8-D342-B53D-9002005459D1}" dt="2023-03-22T13:18:49.111" v="167" actId="1036"/>
-          <ac:cxnSpMkLst>
-            <pc:docMk/>
-            <pc:sldMk cId="72476753" sldId="465"/>
-            <ac:cxnSpMk id="12" creationId="{9854EFCA-F418-40ED-99BF-B164E607B7C6}"/>
-          </ac:cxnSpMkLst>
-        </pc:cxnChg>
       </pc:sldChg>
       <pc:sldChg chg="addSp delSp modSp add del mod delAnim modAnim">
         <pc:chgData name="Alton Russell, Prof." userId="06708d83-fc2b-4190-b0c8-dc9a4695075b" providerId="ADAL" clId="{5279EF03-CDA8-D342-B53D-9002005459D1}" dt="2023-03-22T13:06:20.959" v="160" actId="2696"/>
@@ -689,38 +265,6 @@
           <pc:docMk/>
           <pc:sldMk cId="1244900993" sldId="466"/>
         </pc:sldMkLst>
-        <pc:graphicFrameChg chg="add del mod">
-          <ac:chgData name="Alton Russell, Prof." userId="06708d83-fc2b-4190-b0c8-dc9a4695075b" providerId="ADAL" clId="{5279EF03-CDA8-D342-B53D-9002005459D1}" dt="2023-03-20T16:10:45.730" v="119"/>
-          <ac:graphicFrameMkLst>
-            <pc:docMk/>
-            <pc:sldMk cId="1244900993" sldId="466"/>
-            <ac:graphicFrameMk id="3" creationId="{EF6994BE-3911-C56A-D423-2907C7EB18C5}"/>
-          </ac:graphicFrameMkLst>
-        </pc:graphicFrameChg>
-        <pc:graphicFrameChg chg="add del mod">
-          <ac:chgData name="Alton Russell, Prof." userId="06708d83-fc2b-4190-b0c8-dc9a4695075b" providerId="ADAL" clId="{5279EF03-CDA8-D342-B53D-9002005459D1}" dt="2023-03-20T16:10:48.434" v="121"/>
-          <ac:graphicFrameMkLst>
-            <pc:docMk/>
-            <pc:sldMk cId="1244900993" sldId="466"/>
-            <ac:graphicFrameMk id="9" creationId="{B8C20827-3659-ADE7-0A88-D92378D6B4D6}"/>
-          </ac:graphicFrameMkLst>
-        </pc:graphicFrameChg>
-        <pc:graphicFrameChg chg="add mod modGraphic">
-          <ac:chgData name="Alton Russell, Prof." userId="06708d83-fc2b-4190-b0c8-dc9a4695075b" providerId="ADAL" clId="{5279EF03-CDA8-D342-B53D-9002005459D1}" dt="2023-03-20T16:11:07.514" v="132" actId="6549"/>
-          <ac:graphicFrameMkLst>
-            <pc:docMk/>
-            <pc:sldMk cId="1244900993" sldId="466"/>
-            <ac:graphicFrameMk id="19" creationId="{3F611F71-701C-0FB3-D9FD-B931C673CE31}"/>
-          </ac:graphicFrameMkLst>
-        </pc:graphicFrameChg>
-        <pc:picChg chg="del">
-          <ac:chgData name="Alton Russell, Prof." userId="06708d83-fc2b-4190-b0c8-dc9a4695075b" providerId="ADAL" clId="{5279EF03-CDA8-D342-B53D-9002005459D1}" dt="2023-03-20T16:09:38.931" v="112" actId="478"/>
-          <ac:picMkLst>
-            <pc:docMk/>
-            <pc:sldMk cId="1244900993" sldId="466"/>
-            <ac:picMk id="14" creationId="{CB622402-6AB5-4997-A692-70E10B43E3B8}"/>
-          </ac:picMkLst>
-        </pc:picChg>
       </pc:sldChg>
       <pc:sldChg chg="modSp mod">
         <pc:chgData name="Alton Russell, Prof." userId="06708d83-fc2b-4190-b0c8-dc9a4695075b" providerId="ADAL" clId="{5279EF03-CDA8-D342-B53D-9002005459D1}" dt="2023-03-20T16:11:56.508" v="134" actId="14861"/>
@@ -728,22 +272,6 @@
           <pc:docMk/>
           <pc:sldMk cId="2446918578" sldId="467"/>
         </pc:sldMkLst>
-        <pc:spChg chg="mod">
-          <ac:chgData name="Alton Russell, Prof." userId="06708d83-fc2b-4190-b0c8-dc9a4695075b" providerId="ADAL" clId="{5279EF03-CDA8-D342-B53D-9002005459D1}" dt="2023-03-20T16:11:56.508" v="134" actId="14861"/>
-          <ac:spMkLst>
-            <pc:docMk/>
-            <pc:sldMk cId="2446918578" sldId="467"/>
-            <ac:spMk id="51" creationId="{19CED7DA-039D-4344-B444-4DB6935CABCC}"/>
-          </ac:spMkLst>
-        </pc:spChg>
-        <pc:spChg chg="mod">
-          <ac:chgData name="Alton Russell, Prof." userId="06708d83-fc2b-4190-b0c8-dc9a4695075b" providerId="ADAL" clId="{5279EF03-CDA8-D342-B53D-9002005459D1}" dt="2023-03-20T16:11:56.508" v="134" actId="14861"/>
-          <ac:spMkLst>
-            <pc:docMk/>
-            <pc:sldMk cId="2446918578" sldId="467"/>
-            <ac:spMk id="57" creationId="{91FC24BF-97DE-43F8-82B9-530ED1FB395D}"/>
-          </ac:spMkLst>
-        </pc:spChg>
       </pc:sldChg>
     </pc:docChg>
   </pc:docChgLst>
@@ -760,38 +288,6 @@
           <pc:docMk/>
           <pc:sldMk cId="1224476269" sldId="441"/>
         </pc:sldMkLst>
-        <pc:spChg chg="mod">
-          <ac:chgData name="Alton Russell, Prof." userId="06708d83-fc2b-4190-b0c8-dc9a4695075b" providerId="ADAL" clId="{9E839486-12B6-2047-8452-65108EC110BD}" dt="2024-01-19T01:47:35.267" v="6" actId="14100"/>
-          <ac:spMkLst>
-            <pc:docMk/>
-            <pc:sldMk cId="1224476269" sldId="441"/>
-            <ac:spMk id="6" creationId="{4259FEA2-AE10-40A2-A4F5-FB6E23ECCB64}"/>
-          </ac:spMkLst>
-        </pc:spChg>
-        <pc:spChg chg="mod">
-          <ac:chgData name="Alton Russell, Prof." userId="06708d83-fc2b-4190-b0c8-dc9a4695075b" providerId="ADAL" clId="{9E839486-12B6-2047-8452-65108EC110BD}" dt="2024-01-19T01:47:32.736" v="5" actId="14100"/>
-          <ac:spMkLst>
-            <pc:docMk/>
-            <pc:sldMk cId="1224476269" sldId="441"/>
-            <ac:spMk id="9" creationId="{1EEF9CCE-22BF-4B4A-A52B-135C2EFD1188}"/>
-          </ac:spMkLst>
-        </pc:spChg>
-        <pc:spChg chg="mod">
-          <ac:chgData name="Alton Russell, Prof." userId="06708d83-fc2b-4190-b0c8-dc9a4695075b" providerId="ADAL" clId="{9E839486-12B6-2047-8452-65108EC110BD}" dt="2024-01-19T01:48:59.489" v="14" actId="20577"/>
-          <ac:spMkLst>
-            <pc:docMk/>
-            <pc:sldMk cId="1224476269" sldId="441"/>
-            <ac:spMk id="13" creationId="{F419F929-A7E0-4098-8F9E-98A89EB23408}"/>
-          </ac:spMkLst>
-        </pc:spChg>
-        <pc:spChg chg="mod">
-          <ac:chgData name="Alton Russell, Prof." userId="06708d83-fc2b-4190-b0c8-dc9a4695075b" providerId="ADAL" clId="{9E839486-12B6-2047-8452-65108EC110BD}" dt="2024-01-19T01:48:46.110" v="13" actId="208"/>
-          <ac:spMkLst>
-            <pc:docMk/>
-            <pc:sldMk cId="1224476269" sldId="441"/>
-            <ac:spMk id="15" creationId="{049C2215-7951-4155-888D-FBECDC34B043}"/>
-          </ac:spMkLst>
-        </pc:spChg>
       </pc:sldChg>
     </pc:docChg>
   </pc:docChgLst>
@@ -880,7 +376,7 @@
           <a:p>
             <a:fld id="{CFEE1859-4263-C04F-8FAF-D610645E05EF}" type="datetimeFigureOut">
               <a:rPr lang="en-US" smtClean="0"/>
-              <a:t>1/18/24</a:t>
+              <a:t>4/2/25</a:t>
             </a:fld>
             <a:endParaRPr lang="en-US"/>
           </a:p>
@@ -1045,7 +541,7 @@
           <a:p>
             <a:fld id="{F531145C-1842-F84B-830F-EAD798CE3624}" type="datetimeFigureOut">
               <a:rPr lang="en-US" smtClean="0"/>
-              <a:t>1/18/24</a:t>
+              <a:t>4/2/25</a:t>
             </a:fld>
             <a:endParaRPr lang="en-US"/>
           </a:p>
@@ -3222,14 +2718,14 @@
           </a:ln>
           <a:extLst>
             <a:ext uri="{909E8E84-426E-40dd-AFC4-6F175D3DCCD1}">
-              <a14:hiddenFill xmlns:a14="http://schemas.microsoft.com/office/drawing/2010/main" xmlns="">
+              <a14:hiddenFill xmlns="" xmlns:a14="http://schemas.microsoft.com/office/drawing/2010/main">
                 <a:solidFill>
                   <a:srgbClr val="FFFFFF"/>
                 </a:solidFill>
               </a14:hiddenFill>
             </a:ext>
             <a:ext uri="{91240B29-F687-4f45-9708-019B960494DF}">
-              <a14:hiddenLine xmlns:a14="http://schemas.microsoft.com/office/drawing/2010/main" xmlns="" w="9525">
+              <a14:hiddenLine xmlns="" xmlns:a14="http://schemas.microsoft.com/office/drawing/2010/main" w="9525">
                 <a:solidFill>
                   <a:srgbClr val="000000"/>
                 </a:solidFill>
@@ -4747,14 +4243,14 @@
           </a:ln>
           <a:extLst>
             <a:ext uri="{909E8E84-426E-40dd-AFC4-6F175D3DCCD1}">
-              <a14:hiddenFill xmlns:a14="http://schemas.microsoft.com/office/drawing/2010/main" xmlns="">
+              <a14:hiddenFill xmlns="" xmlns:a14="http://schemas.microsoft.com/office/drawing/2010/main">
                 <a:solidFill>
                   <a:srgbClr val="FFFFFF"/>
                 </a:solidFill>
               </a14:hiddenFill>
             </a:ext>
             <a:ext uri="{91240B29-F687-4f45-9708-019B960494DF}">
-              <a14:hiddenLine xmlns:a14="http://schemas.microsoft.com/office/drawing/2010/main" xmlns="" w="9525">
+              <a14:hiddenLine xmlns="" xmlns:a14="http://schemas.microsoft.com/office/drawing/2010/main" w="9525">
                 <a:solidFill>
                   <a:srgbClr val="000000"/>
                 </a:solidFill>
@@ -6107,14 +5603,14 @@
           </a:ln>
           <a:extLst>
             <a:ext uri="{909E8E84-426E-40dd-AFC4-6F175D3DCCD1}">
-              <a14:hiddenFill xmlns:a14="http://schemas.microsoft.com/office/drawing/2010/main" xmlns="">
+              <a14:hiddenFill xmlns="" xmlns:a14="http://schemas.microsoft.com/office/drawing/2010/main">
                 <a:solidFill>
                   <a:srgbClr val="FFFFFF"/>
                 </a:solidFill>
               </a14:hiddenFill>
             </a:ext>
             <a:ext uri="{91240B29-F687-4f45-9708-019B960494DF}">
-              <a14:hiddenLine xmlns:a14="http://schemas.microsoft.com/office/drawing/2010/main" xmlns="" w="9525">
+              <a14:hiddenLine xmlns="" xmlns:a14="http://schemas.microsoft.com/office/drawing/2010/main" w="9525">
                 <a:solidFill>
                   <a:srgbClr val="000000"/>
                 </a:solidFill>
@@ -6212,14 +5708,14 @@
           </a:ln>
           <a:extLst>
             <a:ext uri="{909E8E84-426E-40dd-AFC4-6F175D3DCCD1}">
-              <a14:hiddenFill xmlns:a14="http://schemas.microsoft.com/office/drawing/2010/main" xmlns="">
+              <a14:hiddenFill xmlns="" xmlns:a14="http://schemas.microsoft.com/office/drawing/2010/main">
                 <a:solidFill>
                   <a:srgbClr val="FFFFFF"/>
                 </a:solidFill>
               </a14:hiddenFill>
             </a:ext>
             <a:ext uri="{91240B29-F687-4f45-9708-019B960494DF}">
-              <a14:hiddenLine xmlns:a14="http://schemas.microsoft.com/office/drawing/2010/main" xmlns="" w="9525">
+              <a14:hiddenLine xmlns="" xmlns:a14="http://schemas.microsoft.com/office/drawing/2010/main" w="9525">
                 <a:solidFill>
                   <a:srgbClr val="000000"/>
                 </a:solidFill>
@@ -6574,14 +6070,14 @@
           </a:ln>
           <a:extLst>
             <a:ext uri="{909E8E84-426E-40dd-AFC4-6F175D3DCCD1}">
-              <a14:hiddenFill xmlns:a14="http://schemas.microsoft.com/office/drawing/2010/main" xmlns="">
+              <a14:hiddenFill xmlns="" xmlns:a14="http://schemas.microsoft.com/office/drawing/2010/main">
                 <a:solidFill>
                   <a:srgbClr val="FFFFFF"/>
                 </a:solidFill>
               </a14:hiddenFill>
             </a:ext>
             <a:ext uri="{91240B29-F687-4f45-9708-019B960494DF}">
-              <a14:hiddenLine xmlns:a14="http://schemas.microsoft.com/office/drawing/2010/main" xmlns="" w="9525">
+              <a14:hiddenLine xmlns="" xmlns:a14="http://schemas.microsoft.com/office/drawing/2010/main" w="9525">
                 <a:solidFill>
                   <a:srgbClr val="000000"/>
                 </a:solidFill>
@@ -6827,17 +6323,17 @@
           </a:ln>
           <a:extLst>
             <a:ext uri="{FAA26D3D-D897-4be2-8F04-BA451C77F1D7}">
-              <ma14:placeholderFlag xmlns:ma14="http://schemas.microsoft.com/office/mac/drawingml/2011/main" xmlns="" val="1"/>
+              <ma14:placeholderFlag xmlns="" xmlns:ma14="http://schemas.microsoft.com/office/mac/drawingml/2011/main" val="1"/>
             </a:ext>
             <a:ext uri="{909E8E84-426E-40dd-AFC4-6F175D3DCCD1}">
-              <a14:hiddenFill xmlns:a14="http://schemas.microsoft.com/office/drawing/2010/main" xmlns="">
+              <a14:hiddenFill xmlns="" xmlns:a14="http://schemas.microsoft.com/office/drawing/2010/main">
                 <a:solidFill>
                   <a:srgbClr val="FFFFFF"/>
                 </a:solidFill>
               </a14:hiddenFill>
             </a:ext>
             <a:ext uri="{91240B29-F687-4f45-9708-019B960494DF}">
-              <a14:hiddenLine xmlns:a14="http://schemas.microsoft.com/office/drawing/2010/main" xmlns="" w="9525">
+              <a14:hiddenLine xmlns="" xmlns:a14="http://schemas.microsoft.com/office/drawing/2010/main" w="9525">
                 <a:solidFill>
                   <a:srgbClr val="000000"/>
                 </a:solidFill>
@@ -7535,17 +7031,17 @@
           </a:ln>
           <a:extLst>
             <a:ext uri="{FAA26D3D-D897-4be2-8F04-BA451C77F1D7}">
-              <ma14:placeholderFlag xmlns:ma14="http://schemas.microsoft.com/office/mac/drawingml/2011/main" xmlns="" val="1"/>
+              <ma14:placeholderFlag xmlns="" xmlns:ma14="http://schemas.microsoft.com/office/mac/drawingml/2011/main" val="1"/>
             </a:ext>
             <a:ext uri="{909E8E84-426E-40dd-AFC4-6F175D3DCCD1}">
-              <a14:hiddenFill xmlns:a14="http://schemas.microsoft.com/office/drawing/2010/main" xmlns="">
+              <a14:hiddenFill xmlns="" xmlns:a14="http://schemas.microsoft.com/office/drawing/2010/main">
                 <a:solidFill>
                   <a:srgbClr val="FFFFFF"/>
                 </a:solidFill>
               </a14:hiddenFill>
             </a:ext>
             <a:ext uri="{91240B29-F687-4f45-9708-019B960494DF}">
-              <a14:hiddenLine xmlns:a14="http://schemas.microsoft.com/office/drawing/2010/main" xmlns="" w="9525">
+              <a14:hiddenLine xmlns="" xmlns:a14="http://schemas.microsoft.com/office/drawing/2010/main" w="9525">
                 <a:solidFill>
                   <a:srgbClr val="000000"/>
                 </a:solidFill>
@@ -8364,7 +7860,7 @@
                   <a:schemeClr val="bg1"/>
                 </a:solidFill>
               </a:rPr>
-              <a:t>20 March 2023</a:t>
+              <a:t>2 April 2025</a:t>
             </a:r>
           </a:p>
         </p:txBody>

</xml_diff>